<commit_message>
add analysis results of glycan and codes for my graduation thesis
</commit_message>
<xml_diff>
--- a/otmm_decimal/result_colab/result_existing_1000_1.0_6_40_ColabPP/result_existing_1000_1.0_6_40_parsing.pptx
+++ b/otmm_decimal/result_colab/result_existing_1000_1.0_6_40_ColabPP/result_existing_1000_1.0_6_40_parsing.pptx
@@ -6,9 +6,10 @@
   </p:sldMasterIdLst>
   <p:sldIdLst>
     <p:sldId id="264" r:id="rId2"/>
-    <p:sldId id="261" r:id="rId3"/>
-    <p:sldId id="262" r:id="rId4"/>
-    <p:sldId id="263" r:id="rId5"/>
+    <p:sldId id="265" r:id="rId3"/>
+    <p:sldId id="261" r:id="rId4"/>
+    <p:sldId id="262" r:id="rId5"/>
+    <p:sldId id="263" r:id="rId6"/>
   </p:sldIdLst>
   <p:sldSz cx="12192000" cy="6858000"/>
   <p:notesSz cx="6858000" cy="9144000"/>
@@ -262,7 +263,7 @@
           <a:p>
             <a:fld id="{A1CCF42C-534B-4F17-84EB-3026585EF5A2}" type="datetimeFigureOut">
               <a:rPr kumimoji="1" lang="ja-JP" altLang="en-US" smtClean="0"/>
-              <a:t>2022/12/29</a:t>
+              <a:t>2023/1/3</a:t>
             </a:fld>
             <a:endParaRPr kumimoji="1" lang="ja-JP" altLang="en-US"/>
           </a:p>
@@ -492,7 +493,7 @@
           <a:p>
             <a:fld id="{A1CCF42C-534B-4F17-84EB-3026585EF5A2}" type="datetimeFigureOut">
               <a:rPr kumimoji="1" lang="ja-JP" altLang="en-US" smtClean="0"/>
-              <a:t>2022/12/29</a:t>
+              <a:t>2023/1/3</a:t>
             </a:fld>
             <a:endParaRPr kumimoji="1" lang="ja-JP" altLang="en-US"/>
           </a:p>
@@ -732,7 +733,7 @@
           <a:p>
             <a:fld id="{A1CCF42C-534B-4F17-84EB-3026585EF5A2}" type="datetimeFigureOut">
               <a:rPr kumimoji="1" lang="ja-JP" altLang="en-US" smtClean="0"/>
-              <a:t>2022/12/29</a:t>
+              <a:t>2023/1/3</a:t>
             </a:fld>
             <a:endParaRPr kumimoji="1" lang="ja-JP" altLang="en-US"/>
           </a:p>
@@ -962,7 +963,7 @@
           <a:p>
             <a:fld id="{A1CCF42C-534B-4F17-84EB-3026585EF5A2}" type="datetimeFigureOut">
               <a:rPr kumimoji="1" lang="ja-JP" altLang="en-US" smtClean="0"/>
-              <a:t>2022/12/29</a:t>
+              <a:t>2023/1/3</a:t>
             </a:fld>
             <a:endParaRPr kumimoji="1" lang="ja-JP" altLang="en-US"/>
           </a:p>
@@ -1237,7 +1238,7 @@
           <a:p>
             <a:fld id="{A1CCF42C-534B-4F17-84EB-3026585EF5A2}" type="datetimeFigureOut">
               <a:rPr kumimoji="1" lang="ja-JP" altLang="en-US" smtClean="0"/>
-              <a:t>2022/12/29</a:t>
+              <a:t>2023/1/3</a:t>
             </a:fld>
             <a:endParaRPr kumimoji="1" lang="ja-JP" altLang="en-US"/>
           </a:p>
@@ -1566,7 +1567,7 @@
           <a:p>
             <a:fld id="{A1CCF42C-534B-4F17-84EB-3026585EF5A2}" type="datetimeFigureOut">
               <a:rPr kumimoji="1" lang="ja-JP" altLang="en-US" smtClean="0"/>
-              <a:t>2022/12/29</a:t>
+              <a:t>2023/1/3</a:t>
             </a:fld>
             <a:endParaRPr kumimoji="1" lang="ja-JP" altLang="en-US"/>
           </a:p>
@@ -2042,7 +2043,7 @@
           <a:p>
             <a:fld id="{A1CCF42C-534B-4F17-84EB-3026585EF5A2}" type="datetimeFigureOut">
               <a:rPr kumimoji="1" lang="ja-JP" altLang="en-US" smtClean="0"/>
-              <a:t>2022/12/29</a:t>
+              <a:t>2023/1/3</a:t>
             </a:fld>
             <a:endParaRPr kumimoji="1" lang="ja-JP" altLang="en-US"/>
           </a:p>
@@ -2183,7 +2184,7 @@
           <a:p>
             <a:fld id="{A1CCF42C-534B-4F17-84EB-3026585EF5A2}" type="datetimeFigureOut">
               <a:rPr kumimoji="1" lang="ja-JP" altLang="en-US" smtClean="0"/>
-              <a:t>2022/12/29</a:t>
+              <a:t>2023/1/3</a:t>
             </a:fld>
             <a:endParaRPr kumimoji="1" lang="ja-JP" altLang="en-US"/>
           </a:p>
@@ -2296,7 +2297,7 @@
           <a:p>
             <a:fld id="{A1CCF42C-534B-4F17-84EB-3026585EF5A2}" type="datetimeFigureOut">
               <a:rPr kumimoji="1" lang="ja-JP" altLang="en-US" smtClean="0"/>
-              <a:t>2022/12/29</a:t>
+              <a:t>2023/1/3</a:t>
             </a:fld>
             <a:endParaRPr kumimoji="1" lang="ja-JP" altLang="en-US"/>
           </a:p>
@@ -2639,7 +2640,7 @@
           <a:p>
             <a:fld id="{A1CCF42C-534B-4F17-84EB-3026585EF5A2}" type="datetimeFigureOut">
               <a:rPr kumimoji="1" lang="ja-JP" altLang="en-US" smtClean="0"/>
-              <a:t>2022/12/29</a:t>
+              <a:t>2023/1/3</a:t>
             </a:fld>
             <a:endParaRPr kumimoji="1" lang="ja-JP" altLang="en-US"/>
           </a:p>
@@ -2927,7 +2928,7 @@
           <a:p>
             <a:fld id="{A1CCF42C-534B-4F17-84EB-3026585EF5A2}" type="datetimeFigureOut">
               <a:rPr kumimoji="1" lang="ja-JP" altLang="en-US" smtClean="0"/>
-              <a:t>2022/12/29</a:t>
+              <a:t>2023/1/3</a:t>
             </a:fld>
             <a:endParaRPr kumimoji="1" lang="ja-JP" altLang="en-US"/>
           </a:p>
@@ -3200,7 +3201,7 @@
           <a:p>
             <a:fld id="{A1CCF42C-534B-4F17-84EB-3026585EF5A2}" type="datetimeFigureOut">
               <a:rPr kumimoji="1" lang="ja-JP" altLang="en-US" smtClean="0"/>
-              <a:t>2022/12/29</a:t>
+              <a:t>2023/1/3</a:t>
             </a:fld>
             <a:endParaRPr kumimoji="1" lang="ja-JP" altLang="en-US"/>
           </a:p>
@@ -6057,7 +6058,7 @@
         </p:nvSpPr>
         <p:spPr>
           <a:xfrm>
-            <a:off x="8922299" y="3211618"/>
+            <a:off x="4766909" y="1740353"/>
             <a:ext cx="439971" cy="434763"/>
           </a:xfrm>
           <a:prstGeom prst="ellipse">
@@ -6092,7 +6093,7 @@
           <a:p>
             <a:pPr algn="ctr"/>
             <a:r>
-              <a:rPr lang="en-US" altLang="ja-JP" dirty="0">
+              <a:rPr kumimoji="1" lang="en-US" altLang="ja-JP" dirty="0">
                 <a:solidFill>
                   <a:schemeClr val="tx1"/>
                 </a:solidFill>
@@ -6107,51 +6108,6 @@
           </a:p>
         </p:txBody>
       </p:sp>
-      <p:cxnSp>
-        <p:nvCxnSpPr>
-          <p:cNvPr id="4" name="直線コネクタ 3">
-            <a:extLst>
-              <a:ext uri="{FF2B5EF4-FFF2-40B4-BE49-F238E27FC236}">
-                <a16:creationId xmlns:a16="http://schemas.microsoft.com/office/drawing/2014/main" id="{6F147F4B-8FAC-056D-BC9B-BF5397D939A4}"/>
-              </a:ext>
-            </a:extLst>
-          </p:cNvPr>
-          <p:cNvCxnSpPr>
-            <a:cxnSpLocks/>
-            <a:stCxn id="5" idx="6"/>
-            <a:endCxn id="2" idx="2"/>
-          </p:cNvCxnSpPr>
-          <p:nvPr/>
-        </p:nvCxnSpPr>
-        <p:spPr>
-          <a:xfrm>
-            <a:off x="8389259" y="3429000"/>
-            <a:ext cx="533040" cy="0"/>
-          </a:xfrm>
-          <a:prstGeom prst="line">
-            <a:avLst/>
-          </a:prstGeom>
-          <a:ln>
-            <a:solidFill>
-              <a:schemeClr val="tx1"/>
-            </a:solidFill>
-          </a:ln>
-        </p:spPr>
-        <p:style>
-          <a:lnRef idx="1">
-            <a:schemeClr val="accent1"/>
-          </a:lnRef>
-          <a:fillRef idx="0">
-            <a:schemeClr val="accent1"/>
-          </a:fillRef>
-          <a:effectRef idx="0">
-            <a:schemeClr val="accent1"/>
-          </a:effectRef>
-          <a:fontRef idx="minor">
-            <a:schemeClr val="tx1"/>
-          </a:fontRef>
-        </p:style>
-      </p:cxnSp>
       <p:sp>
         <p:nvSpPr>
           <p:cNvPr id="5" name="楕円 4">
@@ -6166,7 +6122,7 @@
         </p:nvSpPr>
         <p:spPr>
           <a:xfrm>
-            <a:off x="7949288" y="3211618"/>
+            <a:off x="5855808" y="3623711"/>
             <a:ext cx="439971" cy="434763"/>
           </a:xfrm>
           <a:prstGeom prst="ellipse">
@@ -6206,22 +6162,17 @@
                   <a:schemeClr val="tx1"/>
                 </a:solidFill>
               </a:rPr>
-              <a:t>1</a:t>
-            </a:r>
-            <a:endParaRPr kumimoji="1" lang="ja-JP" altLang="en-US" dirty="0">
-              <a:solidFill>
-                <a:schemeClr val="tx1"/>
-              </a:solidFill>
-            </a:endParaRPr>
-          </a:p>
-        </p:txBody>
-      </p:sp>
-      <p:sp>
-        <p:nvSpPr>
-          <p:cNvPr id="15" name="楕円 14">
-            <a:extLst>
-              <a:ext uri="{FF2B5EF4-FFF2-40B4-BE49-F238E27FC236}">
-                <a16:creationId xmlns:a16="http://schemas.microsoft.com/office/drawing/2014/main" id="{A36C3C59-ABD2-F701-50FD-3A47E6659924}"/>
+              <a:t>5</a:t>
+            </a:r>
+          </a:p>
+        </p:txBody>
+      </p:sp>
+      <p:sp>
+        <p:nvSpPr>
+          <p:cNvPr id="51" name="楕円 50">
+            <a:extLst>
+              <a:ext uri="{FF2B5EF4-FFF2-40B4-BE49-F238E27FC236}">
+                <a16:creationId xmlns:a16="http://schemas.microsoft.com/office/drawing/2014/main" id="{936398A2-1B1A-ADAB-C692-B1CDC54323CD}"/>
               </a:ext>
             </a:extLst>
           </p:cNvPr>
@@ -6230,7 +6181,7 @@
         </p:nvSpPr>
         <p:spPr>
           <a:xfrm>
-            <a:off x="6976277" y="3211617"/>
+            <a:off x="7558603" y="3629255"/>
             <a:ext cx="439971" cy="434763"/>
           </a:xfrm>
           <a:prstGeom prst="ellipse">
@@ -6270,7 +6221,7 @@
                   <a:schemeClr val="tx1"/>
                 </a:solidFill>
               </a:rPr>
-              <a:t>3</a:t>
+              <a:t>2</a:t>
             </a:r>
             <a:endParaRPr kumimoji="1" lang="ja-JP" altLang="en-US" dirty="0">
               <a:solidFill>
@@ -6280,57 +6231,12 @@
           </a:p>
         </p:txBody>
       </p:sp>
-      <p:cxnSp>
-        <p:nvCxnSpPr>
-          <p:cNvPr id="16" name="直線コネクタ 15">
-            <a:extLst>
-              <a:ext uri="{FF2B5EF4-FFF2-40B4-BE49-F238E27FC236}">
-                <a16:creationId xmlns:a16="http://schemas.microsoft.com/office/drawing/2014/main" id="{3A4231B4-3565-5623-E3D4-DFF863B012DB}"/>
-              </a:ext>
-            </a:extLst>
-          </p:cNvPr>
-          <p:cNvCxnSpPr>
-            <a:cxnSpLocks/>
-            <a:stCxn id="15" idx="6"/>
-            <a:endCxn id="5" idx="2"/>
-          </p:cNvCxnSpPr>
-          <p:nvPr/>
-        </p:nvCxnSpPr>
-        <p:spPr>
-          <a:xfrm>
-            <a:off x="7416248" y="3428999"/>
-            <a:ext cx="533040" cy="1"/>
-          </a:xfrm>
-          <a:prstGeom prst="line">
-            <a:avLst/>
-          </a:prstGeom>
-          <a:ln>
-            <a:solidFill>
-              <a:schemeClr val="tx1"/>
-            </a:solidFill>
-          </a:ln>
-        </p:spPr>
-        <p:style>
-          <a:lnRef idx="1">
-            <a:schemeClr val="accent1"/>
-          </a:lnRef>
-          <a:fillRef idx="0">
-            <a:schemeClr val="accent1"/>
-          </a:fillRef>
-          <a:effectRef idx="0">
-            <a:schemeClr val="accent1"/>
-          </a:effectRef>
-          <a:fontRef idx="minor">
-            <a:schemeClr val="tx1"/>
-          </a:fontRef>
-        </p:style>
-      </p:cxnSp>
-      <p:sp>
-        <p:nvSpPr>
-          <p:cNvPr id="19" name="楕円 18">
-            <a:extLst>
-              <a:ext uri="{FF2B5EF4-FFF2-40B4-BE49-F238E27FC236}">
-                <a16:creationId xmlns:a16="http://schemas.microsoft.com/office/drawing/2014/main" id="{F298F2AF-6D9A-4BE2-B86D-1BCB2DFA6915}"/>
+      <p:sp>
+        <p:nvSpPr>
+          <p:cNvPr id="32" name="楕円 31">
+            <a:extLst>
+              <a:ext uri="{FF2B5EF4-FFF2-40B4-BE49-F238E27FC236}">
+                <a16:creationId xmlns:a16="http://schemas.microsoft.com/office/drawing/2014/main" id="{9193736D-8B26-CF1B-F24A-825F893CF20A}"/>
               </a:ext>
             </a:extLst>
           </p:cNvPr>
@@ -6339,7 +6245,7 @@
         </p:nvSpPr>
         <p:spPr>
           <a:xfrm>
-            <a:off x="6003265" y="2170221"/>
+            <a:off x="5855808" y="5239769"/>
             <a:ext cx="439971" cy="434763"/>
           </a:xfrm>
           <a:prstGeom prst="ellipse">
@@ -6379,7 +6285,7 @@
                   <a:schemeClr val="tx1"/>
                 </a:solidFill>
               </a:rPr>
-              <a:t>3</a:t>
+              <a:t>1</a:t>
             </a:r>
             <a:endParaRPr kumimoji="1" lang="ja-JP" altLang="en-US" dirty="0">
               <a:solidFill>
@@ -6391,10 +6297,10 @@
       </p:sp>
       <p:sp>
         <p:nvSpPr>
-          <p:cNvPr id="20" name="楕円 19">
-            <a:extLst>
-              <a:ext uri="{FF2B5EF4-FFF2-40B4-BE49-F238E27FC236}">
-                <a16:creationId xmlns:a16="http://schemas.microsoft.com/office/drawing/2014/main" id="{98118023-75A8-13FF-B3AC-006BB2EB8EDC}"/>
+          <p:cNvPr id="34" name="楕円 33">
+            <a:extLst>
+              <a:ext uri="{FF2B5EF4-FFF2-40B4-BE49-F238E27FC236}">
+                <a16:creationId xmlns:a16="http://schemas.microsoft.com/office/drawing/2014/main" id="{029F04E6-2782-E0D2-F530-D53F6EDD2AF2}"/>
               </a:ext>
             </a:extLst>
           </p:cNvPr>
@@ -6403,7 +6309,7 @@
         </p:nvSpPr>
         <p:spPr>
           <a:xfrm>
-            <a:off x="6003264" y="4253017"/>
+            <a:off x="4303726" y="5239769"/>
             <a:ext cx="439971" cy="434763"/>
           </a:xfrm>
           <a:prstGeom prst="ellipse">
@@ -6438,7 +6344,7 @@
           <a:p>
             <a:pPr algn="ctr"/>
             <a:r>
-              <a:rPr kumimoji="1" lang="en-US" altLang="ja-JP" dirty="0">
+              <a:rPr lang="en-US" altLang="ja-JP" dirty="0">
                 <a:solidFill>
                   <a:schemeClr val="tx1"/>
                 </a:solidFill>
@@ -6453,34 +6359,99 @@
           </a:p>
         </p:txBody>
       </p:sp>
-      <p:cxnSp>
-        <p:nvCxnSpPr>
-          <p:cNvPr id="21" name="直線コネクタ 20">
-            <a:extLst>
-              <a:ext uri="{FF2B5EF4-FFF2-40B4-BE49-F238E27FC236}">
-                <a16:creationId xmlns:a16="http://schemas.microsoft.com/office/drawing/2014/main" id="{5070F677-61C6-9C9B-5F79-303AFF26D89A}"/>
-              </a:ext>
-            </a:extLst>
-          </p:cNvPr>
-          <p:cNvCxnSpPr>
-            <a:cxnSpLocks/>
-            <a:stCxn id="19" idx="5"/>
-            <a:endCxn id="15" idx="1"/>
-          </p:cNvCxnSpPr>
-          <p:nvPr/>
-        </p:nvCxnSpPr>
-        <p:spPr>
-          <a:xfrm>
-            <a:off x="6378804" y="2541314"/>
-            <a:ext cx="661905" cy="733973"/>
-          </a:xfrm>
-          <a:prstGeom prst="line">
-            <a:avLst/>
-          </a:prstGeom>
+      <p:sp>
+        <p:nvSpPr>
+          <p:cNvPr id="6" name="楕円 5">
+            <a:extLst>
+              <a:ext uri="{FF2B5EF4-FFF2-40B4-BE49-F238E27FC236}">
+                <a16:creationId xmlns:a16="http://schemas.microsoft.com/office/drawing/2014/main" id="{DC1FE19C-E750-6470-8CD3-8D42D286515E}"/>
+              </a:ext>
+            </a:extLst>
+          </p:cNvPr>
+          <p:cNvSpPr/>
+          <p:nvPr/>
+        </p:nvSpPr>
+        <p:spPr>
+          <a:xfrm>
+            <a:off x="4303726" y="3635608"/>
+            <a:ext cx="439971" cy="434763"/>
+          </a:xfrm>
+          <a:prstGeom prst="ellipse">
+            <a:avLst/>
+          </a:prstGeom>
+          <a:noFill/>
           <a:ln>
             <a:solidFill>
               <a:schemeClr val="tx1"/>
             </a:solidFill>
+          </a:ln>
+        </p:spPr>
+        <p:style>
+          <a:lnRef idx="2">
+            <a:schemeClr val="accent1">
+              <a:shade val="50000"/>
+            </a:schemeClr>
+          </a:lnRef>
+          <a:fillRef idx="1">
+            <a:schemeClr val="accent1"/>
+          </a:fillRef>
+          <a:effectRef idx="0">
+            <a:schemeClr val="accent1"/>
+          </a:effectRef>
+          <a:fontRef idx="minor">
+            <a:schemeClr val="lt1"/>
+          </a:fontRef>
+        </p:style>
+        <p:txBody>
+          <a:bodyPr rtlCol="0" anchor="ctr"/>
+          <a:lstStyle/>
+          <a:p>
+            <a:pPr algn="ctr"/>
+            <a:r>
+              <a:rPr lang="en-US" altLang="ja-JP" dirty="0">
+                <a:solidFill>
+                  <a:schemeClr val="tx1"/>
+                </a:solidFill>
+              </a:rPr>
+              <a:t>0</a:t>
+            </a:r>
+            <a:endParaRPr kumimoji="1" lang="ja-JP" altLang="en-US" dirty="0">
+              <a:solidFill>
+                <a:schemeClr val="tx1"/>
+              </a:solidFill>
+            </a:endParaRPr>
+          </a:p>
+        </p:txBody>
+      </p:sp>
+      <p:cxnSp>
+        <p:nvCxnSpPr>
+          <p:cNvPr id="11" name="コネクタ: 曲線 10">
+            <a:extLst>
+              <a:ext uri="{FF2B5EF4-FFF2-40B4-BE49-F238E27FC236}">
+                <a16:creationId xmlns:a16="http://schemas.microsoft.com/office/drawing/2014/main" id="{79A5A028-187C-77CD-4546-5DE05F318FF7}"/>
+              </a:ext>
+            </a:extLst>
+          </p:cNvPr>
+          <p:cNvCxnSpPr>
+            <a:stCxn id="34" idx="3"/>
+            <a:endCxn id="34" idx="1"/>
+          </p:cNvCxnSpPr>
+          <p:nvPr/>
+        </p:nvCxnSpPr>
+        <p:spPr>
+          <a:xfrm rot="5400000" flipH="1">
+            <a:off x="4214446" y="5457151"/>
+            <a:ext cx="307423" cy="12700"/>
+          </a:xfrm>
+          <a:prstGeom prst="curvedConnector5">
+            <a:avLst>
+              <a:gd name="adj1" fmla="val -74360"/>
+              <a:gd name="adj2" fmla="val 4757000"/>
+              <a:gd name="adj3" fmla="val 174360"/>
+            </a:avLst>
+          </a:prstGeom>
+          <a:ln w="12700">
+            <a:tailEnd type="triangle"/>
           </a:ln>
         </p:spPr>
         <p:style>
@@ -6500,205 +6471,30 @@
       </p:cxnSp>
       <p:cxnSp>
         <p:nvCxnSpPr>
-          <p:cNvPr id="24" name="直線コネクタ 23">
-            <a:extLst>
-              <a:ext uri="{FF2B5EF4-FFF2-40B4-BE49-F238E27FC236}">
-                <a16:creationId xmlns:a16="http://schemas.microsoft.com/office/drawing/2014/main" id="{F82A930C-F5AB-FBE4-A327-C027ABD864A4}"/>
+          <p:cNvPr id="28" name="直線矢印コネクタ 27">
+            <a:extLst>
+              <a:ext uri="{FF2B5EF4-FFF2-40B4-BE49-F238E27FC236}">
+                <a16:creationId xmlns:a16="http://schemas.microsoft.com/office/drawing/2014/main" id="{2716C3B1-230A-3F38-9399-58DC4A5C0686}"/>
               </a:ext>
             </a:extLst>
           </p:cNvPr>
           <p:cNvCxnSpPr>
             <a:cxnSpLocks/>
-            <a:stCxn id="20" idx="7"/>
-            <a:endCxn id="15" idx="3"/>
+            <a:stCxn id="6" idx="0"/>
+            <a:endCxn id="2" idx="3"/>
           </p:cNvCxnSpPr>
           <p:nvPr/>
         </p:nvCxnSpPr>
         <p:spPr>
           <a:xfrm flipV="1">
-            <a:off x="6378803" y="3582710"/>
-            <a:ext cx="661906" cy="733977"/>
-          </a:xfrm>
-          <a:prstGeom prst="line">
-            <a:avLst/>
-          </a:prstGeom>
-          <a:ln>
-            <a:solidFill>
-              <a:schemeClr val="tx1"/>
-            </a:solidFill>
-          </a:ln>
-        </p:spPr>
-        <p:style>
-          <a:lnRef idx="1">
-            <a:schemeClr val="accent1"/>
-          </a:lnRef>
-          <a:fillRef idx="0">
-            <a:schemeClr val="accent1"/>
-          </a:fillRef>
-          <a:effectRef idx="0">
-            <a:schemeClr val="accent1"/>
-          </a:effectRef>
-          <a:fontRef idx="minor">
-            <a:schemeClr val="tx1"/>
-          </a:fontRef>
-        </p:style>
-      </p:cxnSp>
-      <p:sp>
-        <p:nvSpPr>
-          <p:cNvPr id="29" name="楕円 28">
-            <a:extLst>
-              <a:ext uri="{FF2B5EF4-FFF2-40B4-BE49-F238E27FC236}">
-                <a16:creationId xmlns:a16="http://schemas.microsoft.com/office/drawing/2014/main" id="{1CD800FD-B353-1171-2988-83C6857DE156}"/>
-              </a:ext>
-            </a:extLst>
-          </p:cNvPr>
-          <p:cNvSpPr/>
-          <p:nvPr/>
-        </p:nvSpPr>
-        <p:spPr>
-          <a:xfrm>
-            <a:off x="5003576" y="2604984"/>
-            <a:ext cx="439971" cy="434763"/>
-          </a:xfrm>
-          <a:prstGeom prst="ellipse">
-            <a:avLst/>
-          </a:prstGeom>
-          <a:noFill/>
-          <a:ln>
-            <a:solidFill>
-              <a:schemeClr val="tx1"/>
-            </a:solidFill>
-          </a:ln>
-        </p:spPr>
-        <p:style>
-          <a:lnRef idx="2">
-            <a:schemeClr val="accent1">
-              <a:shade val="50000"/>
-            </a:schemeClr>
-          </a:lnRef>
-          <a:fillRef idx="1">
-            <a:schemeClr val="accent1"/>
-          </a:fillRef>
-          <a:effectRef idx="0">
-            <a:schemeClr val="accent1"/>
-          </a:effectRef>
-          <a:fontRef idx="minor">
-            <a:schemeClr val="lt1"/>
-          </a:fontRef>
-        </p:style>
-        <p:txBody>
-          <a:bodyPr rtlCol="0" anchor="ctr"/>
-          <a:lstStyle/>
-          <a:p>
-            <a:pPr algn="ctr"/>
-            <a:r>
-              <a:rPr kumimoji="1" lang="en-US" altLang="ja-JP" dirty="0">
-                <a:solidFill>
-                  <a:schemeClr val="tx1"/>
-                </a:solidFill>
-              </a:rPr>
-              <a:t>3</a:t>
-            </a:r>
-            <a:endParaRPr kumimoji="1" lang="ja-JP" altLang="en-US" dirty="0">
-              <a:solidFill>
-                <a:schemeClr val="tx1"/>
-              </a:solidFill>
-            </a:endParaRPr>
-          </a:p>
-        </p:txBody>
-      </p:sp>
-      <p:sp>
-        <p:nvSpPr>
-          <p:cNvPr id="33" name="楕円 32">
-            <a:extLst>
-              <a:ext uri="{FF2B5EF4-FFF2-40B4-BE49-F238E27FC236}">
-                <a16:creationId xmlns:a16="http://schemas.microsoft.com/office/drawing/2014/main" id="{81EAF303-AF4F-6280-C2E6-44197D523A05}"/>
-              </a:ext>
-            </a:extLst>
-          </p:cNvPr>
-          <p:cNvSpPr/>
-          <p:nvPr/>
-        </p:nvSpPr>
-        <p:spPr>
-          <a:xfrm>
-            <a:off x="5019342" y="1738766"/>
-            <a:ext cx="439971" cy="434763"/>
-          </a:xfrm>
-          <a:prstGeom prst="ellipse">
-            <a:avLst/>
-          </a:prstGeom>
-          <a:noFill/>
-          <a:ln>
-            <a:solidFill>
-              <a:schemeClr val="tx1"/>
-            </a:solidFill>
-          </a:ln>
-        </p:spPr>
-        <p:style>
-          <a:lnRef idx="2">
-            <a:schemeClr val="accent1">
-              <a:shade val="50000"/>
-            </a:schemeClr>
-          </a:lnRef>
-          <a:fillRef idx="1">
-            <a:schemeClr val="accent1"/>
-          </a:fillRef>
-          <a:effectRef idx="0">
-            <a:schemeClr val="accent1"/>
-          </a:effectRef>
-          <a:fontRef idx="minor">
-            <a:schemeClr val="lt1"/>
-          </a:fontRef>
-        </p:style>
-        <p:txBody>
-          <a:bodyPr rtlCol="0" anchor="ctr"/>
-          <a:lstStyle/>
-          <a:p>
-            <a:pPr algn="ctr"/>
-            <a:r>
-              <a:rPr kumimoji="1" lang="en-US" altLang="ja-JP" dirty="0">
-                <a:solidFill>
-                  <a:schemeClr val="tx1"/>
-                </a:solidFill>
-              </a:rPr>
-              <a:t>3</a:t>
-            </a:r>
-            <a:endParaRPr kumimoji="1" lang="ja-JP" altLang="en-US" dirty="0">
-              <a:solidFill>
-                <a:schemeClr val="tx1"/>
-              </a:solidFill>
-            </a:endParaRPr>
-          </a:p>
-        </p:txBody>
-      </p:sp>
-      <p:cxnSp>
-        <p:nvCxnSpPr>
-          <p:cNvPr id="35" name="直線コネクタ 34">
-            <a:extLst>
-              <a:ext uri="{FF2B5EF4-FFF2-40B4-BE49-F238E27FC236}">
-                <a16:creationId xmlns:a16="http://schemas.microsoft.com/office/drawing/2014/main" id="{3394F000-E77A-B6D4-022D-10AACDA928FB}"/>
-              </a:ext>
-            </a:extLst>
-          </p:cNvPr>
-          <p:cNvCxnSpPr>
-            <a:cxnSpLocks/>
-            <a:stCxn id="33" idx="6"/>
-            <a:endCxn id="19" idx="1"/>
-          </p:cNvCxnSpPr>
-          <p:nvPr/>
-        </p:nvCxnSpPr>
-        <p:spPr>
-          <a:xfrm>
-            <a:off x="5459313" y="1956148"/>
-            <a:ext cx="608384" cy="277743"/>
-          </a:xfrm>
-          <a:prstGeom prst="line">
-            <a:avLst/>
-          </a:prstGeom>
-          <a:ln>
-            <a:solidFill>
-              <a:schemeClr val="tx1"/>
-            </a:solidFill>
+            <a:off x="4523712" y="2111446"/>
+            <a:ext cx="307629" cy="1524162"/>
+          </a:xfrm>
+          <a:prstGeom prst="straightConnector1">
+            <a:avLst/>
+          </a:prstGeom>
+          <a:ln w="12700">
+            <a:tailEnd type="triangle"/>
           </a:ln>
         </p:spPr>
         <p:style>
@@ -6718,32 +6514,30 @@
       </p:cxnSp>
       <p:cxnSp>
         <p:nvCxnSpPr>
-          <p:cNvPr id="48" name="直線コネクタ 47">
-            <a:extLst>
-              <a:ext uri="{FF2B5EF4-FFF2-40B4-BE49-F238E27FC236}">
-                <a16:creationId xmlns:a16="http://schemas.microsoft.com/office/drawing/2014/main" id="{38153412-84F5-4E64-1F56-01EEB3020D40}"/>
+          <p:cNvPr id="43" name="直線矢印コネクタ 42">
+            <a:extLst>
+              <a:ext uri="{FF2B5EF4-FFF2-40B4-BE49-F238E27FC236}">
+                <a16:creationId xmlns:a16="http://schemas.microsoft.com/office/drawing/2014/main" id="{C98EB211-99FB-A8DC-0960-1AE31681AA8E}"/>
               </a:ext>
             </a:extLst>
           </p:cNvPr>
           <p:cNvCxnSpPr>
             <a:cxnSpLocks/>
-            <a:stCxn id="29" idx="6"/>
-            <a:endCxn id="19" idx="3"/>
+            <a:stCxn id="5" idx="7"/>
+            <a:endCxn id="51" idx="1"/>
           </p:cNvCxnSpPr>
           <p:nvPr/>
         </p:nvCxnSpPr>
         <p:spPr>
-          <a:xfrm flipV="1">
-            <a:off x="5443547" y="2541314"/>
-            <a:ext cx="624150" cy="281052"/>
-          </a:xfrm>
-          <a:prstGeom prst="line">
-            <a:avLst/>
-          </a:prstGeom>
-          <a:ln>
-            <a:solidFill>
-              <a:schemeClr val="tx1"/>
-            </a:solidFill>
+          <a:xfrm>
+            <a:off x="6231347" y="3687381"/>
+            <a:ext cx="1391688" cy="5544"/>
+          </a:xfrm>
+          <a:prstGeom prst="straightConnector1">
+            <a:avLst/>
+          </a:prstGeom>
+          <a:ln w="12700">
+            <a:tailEnd type="triangle"/>
           </a:ln>
         </p:spPr>
         <p:style>
@@ -6761,98 +6555,32 @@
           </a:fontRef>
         </p:style>
       </p:cxnSp>
-      <p:sp>
-        <p:nvSpPr>
-          <p:cNvPr id="51" name="楕円 50">
-            <a:extLst>
-              <a:ext uri="{FF2B5EF4-FFF2-40B4-BE49-F238E27FC236}">
-                <a16:creationId xmlns:a16="http://schemas.microsoft.com/office/drawing/2014/main" id="{936398A2-1B1A-ADAB-C692-B1CDC54323CD}"/>
-              </a:ext>
-            </a:extLst>
-          </p:cNvPr>
-          <p:cNvSpPr/>
-          <p:nvPr/>
-        </p:nvSpPr>
-        <p:spPr>
-          <a:xfrm>
-            <a:off x="5035416" y="4253015"/>
-            <a:ext cx="439971" cy="434763"/>
-          </a:xfrm>
-          <a:prstGeom prst="ellipse">
-            <a:avLst/>
-          </a:prstGeom>
-          <a:noFill/>
-          <a:ln>
-            <a:solidFill>
-              <a:schemeClr val="tx1"/>
-            </a:solidFill>
-          </a:ln>
-        </p:spPr>
-        <p:style>
-          <a:lnRef idx="2">
-            <a:schemeClr val="accent1">
-              <a:shade val="50000"/>
-            </a:schemeClr>
-          </a:lnRef>
-          <a:fillRef idx="1">
-            <a:schemeClr val="accent1"/>
-          </a:fillRef>
-          <a:effectRef idx="0">
-            <a:schemeClr val="accent1"/>
-          </a:effectRef>
-          <a:fontRef idx="minor">
-            <a:schemeClr val="lt1"/>
-          </a:fontRef>
-        </p:style>
-        <p:txBody>
-          <a:bodyPr rtlCol="0" anchor="ctr"/>
-          <a:lstStyle/>
-          <a:p>
-            <a:pPr algn="ctr"/>
-            <a:r>
-              <a:rPr kumimoji="1" lang="en-US" altLang="ja-JP" dirty="0">
-                <a:solidFill>
-                  <a:schemeClr val="tx1"/>
-                </a:solidFill>
-              </a:rPr>
-              <a:t>3</a:t>
-            </a:r>
-            <a:endParaRPr kumimoji="1" lang="ja-JP" altLang="en-US" dirty="0">
-              <a:solidFill>
-                <a:schemeClr val="tx1"/>
-              </a:solidFill>
-            </a:endParaRPr>
-          </a:p>
-        </p:txBody>
-      </p:sp>
       <p:cxnSp>
         <p:nvCxnSpPr>
-          <p:cNvPr id="66" name="直線コネクタ 65">
-            <a:extLst>
-              <a:ext uri="{FF2B5EF4-FFF2-40B4-BE49-F238E27FC236}">
-                <a16:creationId xmlns:a16="http://schemas.microsoft.com/office/drawing/2014/main" id="{0D73DC1B-4788-4BEA-BCD5-5A95101381AA}"/>
+          <p:cNvPr id="46" name="直線矢印コネクタ 45">
+            <a:extLst>
+              <a:ext uri="{FF2B5EF4-FFF2-40B4-BE49-F238E27FC236}">
+                <a16:creationId xmlns:a16="http://schemas.microsoft.com/office/drawing/2014/main" id="{2F6BDFF5-D217-6920-EF5A-FD10BC82A8E5}"/>
               </a:ext>
             </a:extLst>
           </p:cNvPr>
           <p:cNvCxnSpPr>
             <a:cxnSpLocks/>
-            <a:stCxn id="68" idx="6"/>
-            <a:endCxn id="33" idx="2"/>
+            <a:stCxn id="32" idx="2"/>
+            <a:endCxn id="34" idx="6"/>
           </p:cNvCxnSpPr>
           <p:nvPr/>
         </p:nvCxnSpPr>
         <p:spPr>
-          <a:xfrm>
-            <a:off x="4462860" y="1956148"/>
-            <a:ext cx="556482" cy="0"/>
-          </a:xfrm>
-          <a:prstGeom prst="line">
-            <a:avLst/>
-          </a:prstGeom>
-          <a:ln>
-            <a:solidFill>
-              <a:schemeClr val="tx1"/>
-            </a:solidFill>
+          <a:xfrm flipH="1">
+            <a:off x="4743697" y="5457151"/>
+            <a:ext cx="1112111" cy="0"/>
+          </a:xfrm>
+          <a:prstGeom prst="straightConnector1">
+            <a:avLst/>
+          </a:prstGeom>
+          <a:ln w="12700">
+            <a:tailEnd type="triangle"/>
           </a:ln>
         </p:spPr>
         <p:style>
@@ -6872,96 +6600,263 @@
       </p:cxnSp>
       <p:sp>
         <p:nvSpPr>
-          <p:cNvPr id="68" name="楕円 67">
-            <a:extLst>
-              <a:ext uri="{FF2B5EF4-FFF2-40B4-BE49-F238E27FC236}">
-                <a16:creationId xmlns:a16="http://schemas.microsoft.com/office/drawing/2014/main" id="{78219453-3070-8E5F-6244-96693EC9F5A2}"/>
-              </a:ext>
-            </a:extLst>
-          </p:cNvPr>
-          <p:cNvSpPr/>
-          <p:nvPr/>
-        </p:nvSpPr>
-        <p:spPr>
-          <a:xfrm>
-            <a:off x="4022889" y="1738766"/>
-            <a:ext cx="439971" cy="434763"/>
-          </a:xfrm>
-          <a:prstGeom prst="ellipse">
+          <p:cNvPr id="50" name="テキスト ボックス 49">
+            <a:extLst>
+              <a:ext uri="{FF2B5EF4-FFF2-40B4-BE49-F238E27FC236}">
+                <a16:creationId xmlns:a16="http://schemas.microsoft.com/office/drawing/2014/main" id="{F10A5CC5-D649-AAC9-1088-BF2C31C40983}"/>
+              </a:ext>
+            </a:extLst>
+          </p:cNvPr>
+          <p:cNvSpPr txBox="1"/>
+          <p:nvPr/>
+        </p:nvSpPr>
+        <p:spPr>
+          <a:xfrm>
+            <a:off x="3107983" y="5146986"/>
+            <a:ext cx="746970" cy="369332"/>
+          </a:xfrm>
+          <a:prstGeom prst="rect">
             <a:avLst/>
           </a:prstGeom>
           <a:noFill/>
-          <a:ln>
-            <a:solidFill>
-              <a:schemeClr val="tx1"/>
-            </a:solidFill>
-          </a:ln>
-        </p:spPr>
-        <p:style>
-          <a:lnRef idx="2">
-            <a:schemeClr val="accent1">
-              <a:shade val="50000"/>
-            </a:schemeClr>
-          </a:lnRef>
-          <a:fillRef idx="1">
-            <a:schemeClr val="accent1"/>
-          </a:fillRef>
-          <a:effectRef idx="0">
-            <a:schemeClr val="accent1"/>
-          </a:effectRef>
-          <a:fontRef idx="minor">
-            <a:schemeClr val="lt1"/>
-          </a:fontRef>
-        </p:style>
-        <p:txBody>
-          <a:bodyPr rtlCol="0" anchor="ctr"/>
+        </p:spPr>
+        <p:txBody>
+          <a:bodyPr wrap="square" rtlCol="0">
+            <a:spAutoFit/>
+          </a:bodyPr>
           <a:lstStyle/>
           <a:p>
             <a:pPr algn="ctr"/>
             <a:r>
               <a:rPr kumimoji="1" lang="en-US" altLang="ja-JP" dirty="0">
                 <a:solidFill>
-                  <a:schemeClr val="tx1"/>
+                  <a:schemeClr val="accent1"/>
                 </a:solidFill>
               </a:rPr>
-              <a:t>3</a:t>
+              <a:t>0.30</a:t>
             </a:r>
             <a:endParaRPr kumimoji="1" lang="ja-JP" altLang="en-US" dirty="0">
               <a:solidFill>
-                <a:schemeClr val="tx1"/>
+                <a:schemeClr val="accent1"/>
               </a:solidFill>
             </a:endParaRPr>
           </a:p>
         </p:txBody>
       </p:sp>
+      <p:sp>
+        <p:nvSpPr>
+          <p:cNvPr id="53" name="テキスト ボックス 52">
+            <a:extLst>
+              <a:ext uri="{FF2B5EF4-FFF2-40B4-BE49-F238E27FC236}">
+                <a16:creationId xmlns:a16="http://schemas.microsoft.com/office/drawing/2014/main" id="{0393430C-50B1-E182-FE13-D04B8868EB6B}"/>
+              </a:ext>
+            </a:extLst>
+          </p:cNvPr>
+          <p:cNvSpPr txBox="1"/>
+          <p:nvPr/>
+        </p:nvSpPr>
+        <p:spPr>
+          <a:xfrm>
+            <a:off x="3984880" y="2512994"/>
+            <a:ext cx="746970" cy="369332"/>
+          </a:xfrm>
+          <a:prstGeom prst="rect">
+            <a:avLst/>
+          </a:prstGeom>
+          <a:noFill/>
+        </p:spPr>
+        <p:txBody>
+          <a:bodyPr wrap="square" rtlCol="0">
+            <a:spAutoFit/>
+          </a:bodyPr>
+          <a:lstStyle/>
+          <a:p>
+            <a:pPr algn="ctr"/>
+            <a:r>
+              <a:rPr lang="en-US" altLang="ja-JP" dirty="0">
+                <a:solidFill>
+                  <a:schemeClr val="accent1"/>
+                </a:solidFill>
+              </a:rPr>
+              <a:t>0.98</a:t>
+            </a:r>
+            <a:endParaRPr kumimoji="1" lang="ja-JP" altLang="en-US" dirty="0">
+              <a:solidFill>
+                <a:schemeClr val="accent1"/>
+              </a:solidFill>
+            </a:endParaRPr>
+          </a:p>
+        </p:txBody>
+      </p:sp>
+      <p:sp>
+        <p:nvSpPr>
+          <p:cNvPr id="54" name="テキスト ボックス 53">
+            <a:extLst>
+              <a:ext uri="{FF2B5EF4-FFF2-40B4-BE49-F238E27FC236}">
+                <a16:creationId xmlns:a16="http://schemas.microsoft.com/office/drawing/2014/main" id="{4947C681-A811-03A0-031F-16BDF633A61E}"/>
+              </a:ext>
+            </a:extLst>
+          </p:cNvPr>
+          <p:cNvSpPr txBox="1"/>
+          <p:nvPr/>
+        </p:nvSpPr>
+        <p:spPr>
+          <a:xfrm>
+            <a:off x="6504545" y="3340545"/>
+            <a:ext cx="746970" cy="369332"/>
+          </a:xfrm>
+          <a:prstGeom prst="rect">
+            <a:avLst/>
+          </a:prstGeom>
+          <a:noFill/>
+        </p:spPr>
+        <p:txBody>
+          <a:bodyPr wrap="square" rtlCol="0">
+            <a:spAutoFit/>
+          </a:bodyPr>
+          <a:lstStyle/>
+          <a:p>
+            <a:pPr algn="ctr"/>
+            <a:r>
+              <a:rPr lang="en-US" altLang="ja-JP" dirty="0">
+                <a:solidFill>
+                  <a:schemeClr val="accent1"/>
+                </a:solidFill>
+              </a:rPr>
+              <a:t>0.86</a:t>
+            </a:r>
+            <a:endParaRPr kumimoji="1" lang="ja-JP" altLang="en-US" dirty="0">
+              <a:solidFill>
+                <a:schemeClr val="accent1"/>
+              </a:solidFill>
+            </a:endParaRPr>
+          </a:p>
+        </p:txBody>
+      </p:sp>
+      <p:sp>
+        <p:nvSpPr>
+          <p:cNvPr id="55" name="テキスト ボックス 54">
+            <a:extLst>
+              <a:ext uri="{FF2B5EF4-FFF2-40B4-BE49-F238E27FC236}">
+                <a16:creationId xmlns:a16="http://schemas.microsoft.com/office/drawing/2014/main" id="{39046CC4-4F5B-F3D6-5761-EBE43BA2F298}"/>
+              </a:ext>
+            </a:extLst>
+          </p:cNvPr>
+          <p:cNvSpPr txBox="1"/>
+          <p:nvPr/>
+        </p:nvSpPr>
+        <p:spPr>
+          <a:xfrm>
+            <a:off x="4941593" y="5432547"/>
+            <a:ext cx="746970" cy="369332"/>
+          </a:xfrm>
+          <a:prstGeom prst="rect">
+            <a:avLst/>
+          </a:prstGeom>
+          <a:noFill/>
+        </p:spPr>
+        <p:txBody>
+          <a:bodyPr wrap="square" rtlCol="0">
+            <a:spAutoFit/>
+          </a:bodyPr>
+          <a:lstStyle/>
+          <a:p>
+            <a:pPr algn="ctr"/>
+            <a:r>
+              <a:rPr lang="en-US" altLang="ja-JP" dirty="0">
+                <a:solidFill>
+                  <a:schemeClr val="accent1"/>
+                </a:solidFill>
+              </a:rPr>
+              <a:t>0.99</a:t>
+            </a:r>
+            <a:endParaRPr kumimoji="1" lang="ja-JP" altLang="en-US" dirty="0">
+              <a:solidFill>
+                <a:schemeClr val="accent1"/>
+              </a:solidFill>
+            </a:endParaRPr>
+          </a:p>
+        </p:txBody>
+      </p:sp>
+      <p:sp>
+        <p:nvSpPr>
+          <p:cNvPr id="70" name="テキスト ボックス 69">
+            <a:extLst>
+              <a:ext uri="{FF2B5EF4-FFF2-40B4-BE49-F238E27FC236}">
+                <a16:creationId xmlns:a16="http://schemas.microsoft.com/office/drawing/2014/main" id="{F9CFA8CC-CB2E-6B1D-6CB9-0E1813490CC2}"/>
+              </a:ext>
+            </a:extLst>
+          </p:cNvPr>
+          <p:cNvSpPr txBox="1"/>
+          <p:nvPr/>
+        </p:nvSpPr>
+        <p:spPr>
+          <a:xfrm>
+            <a:off x="5213514" y="4464455"/>
+            <a:ext cx="746970" cy="369332"/>
+          </a:xfrm>
+          <a:prstGeom prst="rect">
+            <a:avLst/>
+          </a:prstGeom>
+          <a:noFill/>
+        </p:spPr>
+        <p:txBody>
+          <a:bodyPr wrap="square" rtlCol="0">
+            <a:spAutoFit/>
+          </a:bodyPr>
+          <a:lstStyle/>
+          <a:p>
+            <a:pPr algn="ctr"/>
+            <a:r>
+              <a:rPr lang="en-US" altLang="ja-JP" dirty="0">
+                <a:solidFill>
+                  <a:schemeClr val="accent2"/>
+                </a:solidFill>
+              </a:rPr>
+              <a:t>0.99</a:t>
+            </a:r>
+            <a:endParaRPr kumimoji="1" lang="ja-JP" altLang="en-US" dirty="0">
+              <a:solidFill>
+                <a:schemeClr val="accent2"/>
+              </a:solidFill>
+            </a:endParaRPr>
+          </a:p>
+        </p:txBody>
+      </p:sp>
       <p:cxnSp>
         <p:nvCxnSpPr>
-          <p:cNvPr id="89" name="直線コネクタ 88">
-            <a:extLst>
-              <a:ext uri="{FF2B5EF4-FFF2-40B4-BE49-F238E27FC236}">
-                <a16:creationId xmlns:a16="http://schemas.microsoft.com/office/drawing/2014/main" id="{219E3501-C614-A6C3-7C21-28CF0F8C4DF5}"/>
+          <p:cNvPr id="74" name="コネクタ: 曲線 73">
+            <a:extLst>
+              <a:ext uri="{FF2B5EF4-FFF2-40B4-BE49-F238E27FC236}">
+                <a16:creationId xmlns:a16="http://schemas.microsoft.com/office/drawing/2014/main" id="{F85EC4E1-2394-0FC2-6F5E-0E8B99F67B2C}"/>
               </a:ext>
             </a:extLst>
           </p:cNvPr>
           <p:cNvCxnSpPr>
             <a:cxnSpLocks/>
-            <a:stCxn id="90" idx="6"/>
-            <a:endCxn id="68" idx="2"/>
+            <a:stCxn id="6" idx="3"/>
+            <a:endCxn id="6" idx="1"/>
           </p:cNvCxnSpPr>
           <p:nvPr/>
         </p:nvCxnSpPr>
         <p:spPr>
-          <a:xfrm>
-            <a:off x="3466407" y="1956148"/>
-            <a:ext cx="556482" cy="0"/>
-          </a:xfrm>
-          <a:prstGeom prst="line">
-            <a:avLst/>
-          </a:prstGeom>
-          <a:ln>
+          <a:xfrm rot="5400000" flipH="1">
+            <a:off x="4214446" y="3852990"/>
+            <a:ext cx="307423" cy="12700"/>
+          </a:xfrm>
+          <a:prstGeom prst="curvedConnector5">
+            <a:avLst>
+              <a:gd name="adj1" fmla="val -74360"/>
+              <a:gd name="adj2" fmla="val 4757000"/>
+              <a:gd name="adj3" fmla="val 174360"/>
+            </a:avLst>
+          </a:prstGeom>
+          <a:ln w="12700">
             <a:solidFill>
-              <a:schemeClr val="tx1"/>
+              <a:schemeClr val="accent2"/>
             </a:solidFill>
+            <a:prstDash val="sysDash"/>
+            <a:tailEnd type="triangle"/>
           </a:ln>
         </p:spPr>
         <p:style>
@@ -6981,96 +6876,420 @@
       </p:cxnSp>
       <p:sp>
         <p:nvSpPr>
-          <p:cNvPr id="90" name="楕円 89">
-            <a:extLst>
-              <a:ext uri="{FF2B5EF4-FFF2-40B4-BE49-F238E27FC236}">
-                <a16:creationId xmlns:a16="http://schemas.microsoft.com/office/drawing/2014/main" id="{2185B69C-2469-826A-A26E-3F85300008CD}"/>
-              </a:ext>
-            </a:extLst>
-          </p:cNvPr>
-          <p:cNvSpPr/>
-          <p:nvPr/>
-        </p:nvSpPr>
-        <p:spPr>
-          <a:xfrm>
-            <a:off x="3026436" y="1738766"/>
-            <a:ext cx="439971" cy="434763"/>
-          </a:xfrm>
-          <a:prstGeom prst="ellipse">
+          <p:cNvPr id="79" name="テキスト ボックス 78">
+            <a:extLst>
+              <a:ext uri="{FF2B5EF4-FFF2-40B4-BE49-F238E27FC236}">
+                <a16:creationId xmlns:a16="http://schemas.microsoft.com/office/drawing/2014/main" id="{A5CFDFFF-6A55-BA0A-5AB9-8D00E82AB384}"/>
+              </a:ext>
+            </a:extLst>
+          </p:cNvPr>
+          <p:cNvSpPr txBox="1"/>
+          <p:nvPr/>
+        </p:nvSpPr>
+        <p:spPr>
+          <a:xfrm>
+            <a:off x="3108427" y="3658085"/>
+            <a:ext cx="746970" cy="369332"/>
+          </a:xfrm>
+          <a:prstGeom prst="rect">
             <a:avLst/>
           </a:prstGeom>
           <a:noFill/>
+        </p:spPr>
+        <p:txBody>
+          <a:bodyPr wrap="square" rtlCol="0">
+            <a:spAutoFit/>
+          </a:bodyPr>
+          <a:lstStyle/>
+          <a:p>
+            <a:pPr algn="ctr"/>
+            <a:r>
+              <a:rPr kumimoji="1" lang="en-US" altLang="ja-JP" dirty="0">
+                <a:solidFill>
+                  <a:schemeClr val="accent2"/>
+                </a:solidFill>
+              </a:rPr>
+              <a:t>0.99</a:t>
+            </a:r>
+            <a:endParaRPr kumimoji="1" lang="ja-JP" altLang="en-US" dirty="0">
+              <a:solidFill>
+                <a:schemeClr val="accent2"/>
+              </a:solidFill>
+            </a:endParaRPr>
+          </a:p>
+        </p:txBody>
+      </p:sp>
+      <p:sp>
+        <p:nvSpPr>
+          <p:cNvPr id="102" name="テキスト ボックス 101">
+            <a:extLst>
+              <a:ext uri="{FF2B5EF4-FFF2-40B4-BE49-F238E27FC236}">
+                <a16:creationId xmlns:a16="http://schemas.microsoft.com/office/drawing/2014/main" id="{4E8FCA23-45A3-3A9F-4D51-A6D83C93C2CA}"/>
+              </a:ext>
+            </a:extLst>
+          </p:cNvPr>
+          <p:cNvSpPr txBox="1"/>
+          <p:nvPr/>
+        </p:nvSpPr>
+        <p:spPr>
+          <a:xfrm>
+            <a:off x="8545163" y="3823429"/>
+            <a:ext cx="746970" cy="369332"/>
+          </a:xfrm>
+          <a:prstGeom prst="rect">
+            <a:avLst/>
+          </a:prstGeom>
+          <a:noFill/>
+        </p:spPr>
+        <p:txBody>
+          <a:bodyPr wrap="square" rtlCol="0">
+            <a:spAutoFit/>
+          </a:bodyPr>
+          <a:lstStyle/>
+          <a:p>
+            <a:pPr algn="ctr"/>
+            <a:r>
+              <a:rPr kumimoji="1" lang="en-US" altLang="ja-JP" dirty="0">
+                <a:solidFill>
+                  <a:schemeClr val="accent2"/>
+                </a:solidFill>
+              </a:rPr>
+              <a:t>0.68</a:t>
+            </a:r>
+            <a:endParaRPr kumimoji="1" lang="ja-JP" altLang="en-US" dirty="0">
+              <a:solidFill>
+                <a:schemeClr val="accent2"/>
+              </a:solidFill>
+            </a:endParaRPr>
+          </a:p>
+        </p:txBody>
+      </p:sp>
+      <p:sp>
+        <p:nvSpPr>
+          <p:cNvPr id="103" name="テキスト ボックス 102">
+            <a:extLst>
+              <a:ext uri="{FF2B5EF4-FFF2-40B4-BE49-F238E27FC236}">
+                <a16:creationId xmlns:a16="http://schemas.microsoft.com/office/drawing/2014/main" id="{ED62F39F-F050-93F7-3118-84F27C8772E6}"/>
+              </a:ext>
+            </a:extLst>
+          </p:cNvPr>
+          <p:cNvSpPr txBox="1"/>
+          <p:nvPr/>
+        </p:nvSpPr>
+        <p:spPr>
+          <a:xfrm>
+            <a:off x="6310376" y="5303263"/>
+            <a:ext cx="1112111" cy="338554"/>
+          </a:xfrm>
+          <a:prstGeom prst="rect">
+            <a:avLst/>
+          </a:prstGeom>
+          <a:noFill/>
+        </p:spPr>
+        <p:txBody>
+          <a:bodyPr wrap="square" rtlCol="0">
+            <a:spAutoFit/>
+          </a:bodyPr>
+          <a:lstStyle/>
+          <a:p>
+            <a:r>
+              <a:rPr lang="en-US" altLang="ja-JP" sz="1600" dirty="0" err="1"/>
+              <a:t>GlcNAc</a:t>
+            </a:r>
+            <a:r>
+              <a:rPr kumimoji="1" lang="en-US" altLang="ja-JP" sz="1600" dirty="0"/>
+              <a:t> </a:t>
+            </a:r>
+            <a:r>
+              <a:rPr lang="en-US" altLang="ja-JP" sz="1600" dirty="0"/>
+              <a:t>1</a:t>
+            </a:r>
+            <a:endParaRPr kumimoji="1" lang="en-US" altLang="ja-JP" sz="1600" dirty="0"/>
+          </a:p>
+        </p:txBody>
+      </p:sp>
+      <p:sp>
+        <p:nvSpPr>
+          <p:cNvPr id="104" name="テキスト ボックス 103">
+            <a:extLst>
+              <a:ext uri="{FF2B5EF4-FFF2-40B4-BE49-F238E27FC236}">
+                <a16:creationId xmlns:a16="http://schemas.microsoft.com/office/drawing/2014/main" id="{A140B53C-A096-9541-410A-DA6620265CBB}"/>
+              </a:ext>
+            </a:extLst>
+          </p:cNvPr>
+          <p:cNvSpPr txBox="1"/>
+          <p:nvPr/>
+        </p:nvSpPr>
+        <p:spPr>
+          <a:xfrm>
+            <a:off x="3458266" y="3111508"/>
+            <a:ext cx="1120671" cy="338554"/>
+          </a:xfrm>
+          <a:prstGeom prst="rect">
+            <a:avLst/>
+          </a:prstGeom>
+          <a:noFill/>
+        </p:spPr>
+        <p:txBody>
+          <a:bodyPr wrap="square" rtlCol="0">
+            <a:spAutoFit/>
+          </a:bodyPr>
+          <a:lstStyle/>
+          <a:p>
+            <a:r>
+              <a:rPr lang="en-US" altLang="ja-JP" sz="1600" dirty="0"/>
+              <a:t>Man 0.93</a:t>
+            </a:r>
+            <a:endParaRPr kumimoji="1" lang="ja-JP" altLang="en-US" sz="1600" dirty="0"/>
+          </a:p>
+        </p:txBody>
+      </p:sp>
+      <p:sp>
+        <p:nvSpPr>
+          <p:cNvPr id="108" name="テキスト ボックス 107">
+            <a:extLst>
+              <a:ext uri="{FF2B5EF4-FFF2-40B4-BE49-F238E27FC236}">
+                <a16:creationId xmlns:a16="http://schemas.microsoft.com/office/drawing/2014/main" id="{FFB2F5CA-4011-B4B6-39EC-601F7B0AA659}"/>
+              </a:ext>
+            </a:extLst>
+          </p:cNvPr>
+          <p:cNvSpPr txBox="1"/>
+          <p:nvPr/>
+        </p:nvSpPr>
+        <p:spPr>
+          <a:xfrm>
+            <a:off x="3422990" y="1764881"/>
+            <a:ext cx="1343797" cy="338554"/>
+          </a:xfrm>
+          <a:prstGeom prst="rect">
+            <a:avLst/>
+          </a:prstGeom>
+          <a:noFill/>
+        </p:spPr>
+        <p:txBody>
+          <a:bodyPr wrap="square" rtlCol="0">
+            <a:spAutoFit/>
+          </a:bodyPr>
+          <a:lstStyle/>
+          <a:p>
+            <a:r>
+              <a:rPr lang="en-US" altLang="ja-JP" sz="1600" dirty="0" err="1"/>
+              <a:t>GlcNAc</a:t>
+            </a:r>
+            <a:r>
+              <a:rPr kumimoji="1" lang="en-US" altLang="ja-JP" sz="1600" dirty="0"/>
+              <a:t> 0.96</a:t>
+            </a:r>
+            <a:endParaRPr kumimoji="1" lang="ja-JP" altLang="en-US" sz="1600" dirty="0"/>
+          </a:p>
+        </p:txBody>
+      </p:sp>
+      <p:sp>
+        <p:nvSpPr>
+          <p:cNvPr id="109" name="テキスト ボックス 108">
+            <a:extLst>
+              <a:ext uri="{FF2B5EF4-FFF2-40B4-BE49-F238E27FC236}">
+                <a16:creationId xmlns:a16="http://schemas.microsoft.com/office/drawing/2014/main" id="{76509186-E1EF-DFBD-E4E7-F72BAA18AB80}"/>
+              </a:ext>
+            </a:extLst>
+          </p:cNvPr>
+          <p:cNvSpPr txBox="1"/>
+          <p:nvPr/>
+        </p:nvSpPr>
+        <p:spPr>
+          <a:xfrm>
+            <a:off x="7623035" y="4249014"/>
+            <a:ext cx="1382436" cy="584775"/>
+          </a:xfrm>
+          <a:prstGeom prst="rect">
+            <a:avLst/>
+          </a:prstGeom>
+          <a:noFill/>
+        </p:spPr>
+        <p:txBody>
+          <a:bodyPr wrap="square" rtlCol="0">
+            <a:spAutoFit/>
+          </a:bodyPr>
+          <a:lstStyle/>
+          <a:p>
+            <a:r>
+              <a:rPr kumimoji="1" lang="en-US" altLang="ja-JP" sz="1600" dirty="0"/>
+              <a:t>Neu5Ac 0.56</a:t>
+            </a:r>
+          </a:p>
+          <a:p>
+            <a:r>
+              <a:rPr kumimoji="1" lang="en-US" altLang="ja-JP" sz="1600" dirty="0"/>
+              <a:t>Neu5Gc</a:t>
+            </a:r>
+            <a:r>
+              <a:rPr lang="en-US" altLang="ja-JP" sz="1600" dirty="0"/>
+              <a:t> 0.14</a:t>
+            </a:r>
+            <a:endParaRPr kumimoji="1" lang="ja-JP" altLang="en-US" sz="1600" dirty="0"/>
+          </a:p>
+        </p:txBody>
+      </p:sp>
+      <p:sp>
+        <p:nvSpPr>
+          <p:cNvPr id="115" name="テキスト ボックス 114">
+            <a:extLst>
+              <a:ext uri="{FF2B5EF4-FFF2-40B4-BE49-F238E27FC236}">
+                <a16:creationId xmlns:a16="http://schemas.microsoft.com/office/drawing/2014/main" id="{0FB3F1A7-8EBD-6435-74BB-6AFD698F9531}"/>
+              </a:ext>
+            </a:extLst>
+          </p:cNvPr>
+          <p:cNvSpPr txBox="1"/>
+          <p:nvPr/>
+        </p:nvSpPr>
+        <p:spPr>
+          <a:xfrm>
+            <a:off x="5747622" y="2890698"/>
+            <a:ext cx="1075437" cy="584775"/>
+          </a:xfrm>
+          <a:prstGeom prst="rect">
+            <a:avLst/>
+          </a:prstGeom>
+          <a:noFill/>
+        </p:spPr>
+        <p:txBody>
+          <a:bodyPr wrap="square" rtlCol="0">
+            <a:spAutoFit/>
+          </a:bodyPr>
+          <a:lstStyle/>
+          <a:p>
+            <a:r>
+              <a:rPr kumimoji="1" lang="en-US" altLang="ja-JP" sz="1600" dirty="0"/>
+              <a:t>Gal 0.70</a:t>
+            </a:r>
+          </a:p>
+          <a:p>
+            <a:r>
+              <a:rPr lang="en-US" altLang="ja-JP" sz="1600" dirty="0" err="1"/>
+              <a:t>Fuc</a:t>
+            </a:r>
+            <a:r>
+              <a:rPr lang="en-US" altLang="ja-JP" sz="1600" dirty="0"/>
+              <a:t> 0.20</a:t>
+            </a:r>
+            <a:endParaRPr kumimoji="1" lang="ja-JP" altLang="en-US" sz="1600" dirty="0"/>
+          </a:p>
+        </p:txBody>
+      </p:sp>
+      <p:sp>
+        <p:nvSpPr>
+          <p:cNvPr id="142" name="テキスト ボックス 141">
+            <a:extLst>
+              <a:ext uri="{FF2B5EF4-FFF2-40B4-BE49-F238E27FC236}">
+                <a16:creationId xmlns:a16="http://schemas.microsoft.com/office/drawing/2014/main" id="{733A55CB-FEB6-AB37-CE6B-855EC3AC2569}"/>
+              </a:ext>
+            </a:extLst>
+          </p:cNvPr>
+          <p:cNvSpPr txBox="1"/>
+          <p:nvPr/>
+        </p:nvSpPr>
+        <p:spPr>
+          <a:xfrm>
+            <a:off x="3804589" y="5896429"/>
+            <a:ext cx="1102310" cy="338554"/>
+          </a:xfrm>
+          <a:prstGeom prst="rect">
+            <a:avLst/>
+          </a:prstGeom>
+          <a:noFill/>
+        </p:spPr>
+        <p:txBody>
+          <a:bodyPr wrap="square" rtlCol="0">
+            <a:spAutoFit/>
+          </a:bodyPr>
+          <a:lstStyle/>
+          <a:p>
+            <a:r>
+              <a:rPr lang="en-US" altLang="ja-JP" sz="1600" dirty="0"/>
+              <a:t>Man 0.96</a:t>
+            </a:r>
+            <a:endParaRPr kumimoji="1" lang="ja-JP" altLang="en-US" sz="1600" dirty="0"/>
+          </a:p>
+        </p:txBody>
+      </p:sp>
+      <p:sp>
+        <p:nvSpPr>
+          <p:cNvPr id="143" name="テキスト ボックス 142">
+            <a:extLst>
+              <a:ext uri="{FF2B5EF4-FFF2-40B4-BE49-F238E27FC236}">
+                <a16:creationId xmlns:a16="http://schemas.microsoft.com/office/drawing/2014/main" id="{6685B834-3680-EE44-1F00-4F893FF49276}"/>
+              </a:ext>
+            </a:extLst>
+          </p:cNvPr>
+          <p:cNvSpPr txBox="1"/>
+          <p:nvPr/>
+        </p:nvSpPr>
+        <p:spPr>
+          <a:xfrm>
+            <a:off x="4648772" y="791492"/>
+            <a:ext cx="666306" cy="338554"/>
+          </a:xfrm>
+          <a:prstGeom prst="rect">
+            <a:avLst/>
+          </a:prstGeom>
+        </p:spPr>
+        <p:style>
+          <a:lnRef idx="2">
+            <a:schemeClr val="dk1"/>
+          </a:lnRef>
+          <a:fillRef idx="1">
+            <a:schemeClr val="lt1"/>
+          </a:fillRef>
+          <a:effectRef idx="0">
+            <a:schemeClr val="dk1"/>
+          </a:effectRef>
+          <a:fontRef idx="minor">
+            <a:schemeClr val="dk1"/>
+          </a:fontRef>
+        </p:style>
+        <p:txBody>
+          <a:bodyPr wrap="square" rtlCol="0">
+            <a:spAutoFit/>
+          </a:bodyPr>
+          <a:lstStyle/>
+          <a:p>
+            <a:r>
+              <a:rPr lang="en-US" altLang="ja-JP" sz="1600" dirty="0"/>
+              <a:t>Start</a:t>
+            </a:r>
+            <a:endParaRPr kumimoji="1" lang="ja-JP" altLang="en-US" sz="1600" dirty="0"/>
+          </a:p>
+        </p:txBody>
+      </p:sp>
+      <p:cxnSp>
+        <p:nvCxnSpPr>
+          <p:cNvPr id="145" name="直線矢印コネクタ 144">
+            <a:extLst>
+              <a:ext uri="{FF2B5EF4-FFF2-40B4-BE49-F238E27FC236}">
+                <a16:creationId xmlns:a16="http://schemas.microsoft.com/office/drawing/2014/main" id="{A3C25552-405F-2DD2-5113-4AC6AA055EE9}"/>
+              </a:ext>
+            </a:extLst>
+          </p:cNvPr>
+          <p:cNvCxnSpPr>
+            <a:cxnSpLocks/>
+            <a:stCxn id="143" idx="2"/>
+            <a:endCxn id="2" idx="0"/>
+          </p:cNvCxnSpPr>
+          <p:nvPr/>
+        </p:nvCxnSpPr>
+        <p:spPr>
+          <a:xfrm>
+            <a:off x="4981925" y="1130046"/>
+            <a:ext cx="4970" cy="610307"/>
+          </a:xfrm>
+          <a:prstGeom prst="straightConnector1">
+            <a:avLst/>
+          </a:prstGeom>
           <a:ln>
             <a:solidFill>
               <a:schemeClr val="tx1"/>
             </a:solidFill>
-          </a:ln>
-        </p:spPr>
-        <p:style>
-          <a:lnRef idx="2">
-            <a:schemeClr val="accent1">
-              <a:shade val="50000"/>
-            </a:schemeClr>
-          </a:lnRef>
-          <a:fillRef idx="1">
-            <a:schemeClr val="accent1"/>
-          </a:fillRef>
-          <a:effectRef idx="0">
-            <a:schemeClr val="accent1"/>
-          </a:effectRef>
-          <a:fontRef idx="minor">
-            <a:schemeClr val="lt1"/>
-          </a:fontRef>
-        </p:style>
-        <p:txBody>
-          <a:bodyPr rtlCol="0" anchor="ctr"/>
-          <a:lstStyle/>
-          <a:p>
-            <a:pPr algn="ctr"/>
-            <a:r>
-              <a:rPr kumimoji="1" lang="en-US" altLang="ja-JP" dirty="0">
-                <a:solidFill>
-                  <a:schemeClr val="tx1"/>
-                </a:solidFill>
-              </a:rPr>
-              <a:t>3</a:t>
-            </a:r>
-            <a:endParaRPr kumimoji="1" lang="ja-JP" altLang="en-US" dirty="0">
-              <a:solidFill>
-                <a:schemeClr val="tx1"/>
-              </a:solidFill>
-            </a:endParaRPr>
-          </a:p>
-        </p:txBody>
-      </p:sp>
-      <p:cxnSp>
-        <p:nvCxnSpPr>
-          <p:cNvPr id="92" name="直線コネクタ 91">
-            <a:extLst>
-              <a:ext uri="{FF2B5EF4-FFF2-40B4-BE49-F238E27FC236}">
-                <a16:creationId xmlns:a16="http://schemas.microsoft.com/office/drawing/2014/main" id="{F0188C79-281A-7EB4-B7A7-0B74E0A01B6C}"/>
-              </a:ext>
-            </a:extLst>
-          </p:cNvPr>
-          <p:cNvCxnSpPr>
-            <a:cxnSpLocks/>
-            <a:stCxn id="93" idx="6"/>
-            <a:endCxn id="29" idx="2"/>
-          </p:cNvCxnSpPr>
-          <p:nvPr/>
-        </p:nvCxnSpPr>
-        <p:spPr>
-          <a:xfrm>
-            <a:off x="4462860" y="2822366"/>
-            <a:ext cx="540716" cy="0"/>
-          </a:xfrm>
-          <a:prstGeom prst="line">
-            <a:avLst/>
-          </a:prstGeom>
-          <a:ln>
-            <a:solidFill>
-              <a:schemeClr val="tx1"/>
-            </a:solidFill>
+            <a:tailEnd type="triangle"/>
           </a:ln>
         </p:spPr>
         <p:style>
@@ -7090,63 +7309,81 @@
       </p:cxnSp>
       <p:sp>
         <p:nvSpPr>
-          <p:cNvPr id="93" name="楕円 92">
-            <a:extLst>
-              <a:ext uri="{FF2B5EF4-FFF2-40B4-BE49-F238E27FC236}">
-                <a16:creationId xmlns:a16="http://schemas.microsoft.com/office/drawing/2014/main" id="{72B03E98-54FC-6EE9-49BB-063EFC599DCE}"/>
-              </a:ext>
-            </a:extLst>
-          </p:cNvPr>
-          <p:cNvSpPr/>
-          <p:nvPr/>
-        </p:nvSpPr>
-        <p:spPr>
-          <a:xfrm>
-            <a:off x="4022889" y="2604984"/>
-            <a:ext cx="439971" cy="434763"/>
-          </a:xfrm>
-          <a:prstGeom prst="ellipse">
+          <p:cNvPr id="148" name="テキスト ボックス 147">
+            <a:extLst>
+              <a:ext uri="{FF2B5EF4-FFF2-40B4-BE49-F238E27FC236}">
+                <a16:creationId xmlns:a16="http://schemas.microsoft.com/office/drawing/2014/main" id="{3D957B80-979B-3AFD-F6EC-56906C9DD086}"/>
+              </a:ext>
+            </a:extLst>
+          </p:cNvPr>
+          <p:cNvSpPr txBox="1"/>
+          <p:nvPr/>
+        </p:nvSpPr>
+        <p:spPr>
+          <a:xfrm>
+            <a:off x="4981925" y="1265922"/>
+            <a:ext cx="360158" cy="338554"/>
+          </a:xfrm>
+          <a:prstGeom prst="rect">
             <a:avLst/>
           </a:prstGeom>
           <a:noFill/>
-          <a:ln>
-            <a:solidFill>
-              <a:schemeClr val="tx1"/>
-            </a:solidFill>
-          </a:ln>
-        </p:spPr>
-        <p:style>
-          <a:lnRef idx="2">
-            <a:schemeClr val="accent1">
-              <a:shade val="50000"/>
-            </a:schemeClr>
-          </a:lnRef>
-          <a:fillRef idx="1">
-            <a:schemeClr val="accent1"/>
-          </a:fillRef>
-          <a:effectRef idx="0">
-            <a:schemeClr val="accent1"/>
-          </a:effectRef>
-          <a:fontRef idx="minor">
-            <a:schemeClr val="lt1"/>
-          </a:fontRef>
-        </p:style>
-        <p:txBody>
-          <a:bodyPr rtlCol="0" anchor="ctr"/>
+        </p:spPr>
+        <p:txBody>
+          <a:bodyPr wrap="square" rtlCol="0">
+            <a:spAutoFit/>
+          </a:bodyPr>
           <a:lstStyle/>
           <a:p>
             <a:pPr algn="ctr"/>
             <a:r>
-              <a:rPr kumimoji="1" lang="en-US" altLang="ja-JP" dirty="0">
+              <a:rPr kumimoji="1" lang="en-US" altLang="ja-JP" sz="1600" dirty="0"/>
+              <a:t>1</a:t>
+            </a:r>
+            <a:endParaRPr kumimoji="1" lang="ja-JP" altLang="en-US" sz="1600" dirty="0"/>
+          </a:p>
+        </p:txBody>
+      </p:sp>
+      <p:sp>
+        <p:nvSpPr>
+          <p:cNvPr id="15" name="テキスト ボックス 14">
+            <a:extLst>
+              <a:ext uri="{FF2B5EF4-FFF2-40B4-BE49-F238E27FC236}">
+                <a16:creationId xmlns:a16="http://schemas.microsoft.com/office/drawing/2014/main" id="{AC72D0BF-A2D9-97BE-6AD9-F37275D140D1}"/>
+              </a:ext>
+            </a:extLst>
+          </p:cNvPr>
+          <p:cNvSpPr txBox="1"/>
+          <p:nvPr/>
+        </p:nvSpPr>
+        <p:spPr>
+          <a:xfrm>
+            <a:off x="8545163" y="3511283"/>
+            <a:ext cx="746970" cy="369332"/>
+          </a:xfrm>
+          <a:prstGeom prst="rect">
+            <a:avLst/>
+          </a:prstGeom>
+          <a:noFill/>
+        </p:spPr>
+        <p:txBody>
+          <a:bodyPr wrap="square" rtlCol="0">
+            <a:spAutoFit/>
+          </a:bodyPr>
+          <a:lstStyle/>
+          <a:p>
+            <a:pPr algn="ctr"/>
+            <a:r>
+              <a:rPr lang="en-US" altLang="ja-JP" dirty="0">
                 <a:solidFill>
-                  <a:schemeClr val="tx1"/>
+                  <a:schemeClr val="accent1"/>
                 </a:solidFill>
               </a:rPr>
-              <a:t>3</a:t>
+              <a:t>0.95</a:t>
             </a:r>
             <a:endParaRPr kumimoji="1" lang="ja-JP" altLang="en-US" dirty="0">
               <a:solidFill>
-                <a:schemeClr val="tx1"/>
+                <a:schemeClr val="accent1"/>
               </a:solidFill>
             </a:endParaRPr>
           </a:p>
@@ -7154,32 +7391,30 @@
       </p:sp>
       <p:cxnSp>
         <p:nvCxnSpPr>
-          <p:cNvPr id="94" name="直線コネクタ 93">
-            <a:extLst>
-              <a:ext uri="{FF2B5EF4-FFF2-40B4-BE49-F238E27FC236}">
-                <a16:creationId xmlns:a16="http://schemas.microsoft.com/office/drawing/2014/main" id="{2A3434F9-101A-C370-87D9-B8A615A1B98C}"/>
+          <p:cNvPr id="3" name="直線矢印コネクタ 2">
+            <a:extLst>
+              <a:ext uri="{FF2B5EF4-FFF2-40B4-BE49-F238E27FC236}">
+                <a16:creationId xmlns:a16="http://schemas.microsoft.com/office/drawing/2014/main" id="{A43A4B9A-2F69-1553-D789-31815101D444}"/>
               </a:ext>
             </a:extLst>
           </p:cNvPr>
           <p:cNvCxnSpPr>
             <a:cxnSpLocks/>
-            <a:stCxn id="95" idx="6"/>
-            <a:endCxn id="93" idx="2"/>
+            <a:stCxn id="2" idx="5"/>
+            <a:endCxn id="5" idx="1"/>
           </p:cNvCxnSpPr>
           <p:nvPr/>
         </p:nvCxnSpPr>
         <p:spPr>
           <a:xfrm>
-            <a:off x="3467843" y="2822366"/>
-            <a:ext cx="555046" cy="0"/>
-          </a:xfrm>
-          <a:prstGeom prst="line">
-            <a:avLst/>
-          </a:prstGeom>
-          <a:ln>
-            <a:solidFill>
-              <a:schemeClr val="tx1"/>
-            </a:solidFill>
+            <a:off x="5142448" y="2111446"/>
+            <a:ext cx="777792" cy="1575935"/>
+          </a:xfrm>
+          <a:prstGeom prst="straightConnector1">
+            <a:avLst/>
+          </a:prstGeom>
+          <a:ln w="12700">
+            <a:tailEnd type="triangle"/>
           </a:ln>
         </p:spPr>
         <p:style>
@@ -7199,63 +7434,44 @@
       </p:cxnSp>
       <p:sp>
         <p:nvSpPr>
-          <p:cNvPr id="95" name="楕円 94">
-            <a:extLst>
-              <a:ext uri="{FF2B5EF4-FFF2-40B4-BE49-F238E27FC236}">
-                <a16:creationId xmlns:a16="http://schemas.microsoft.com/office/drawing/2014/main" id="{9BADADBC-278B-8A91-3D80-907EC7D90CD2}"/>
-              </a:ext>
-            </a:extLst>
-          </p:cNvPr>
-          <p:cNvSpPr/>
-          <p:nvPr/>
-        </p:nvSpPr>
-        <p:spPr>
-          <a:xfrm>
-            <a:off x="3027872" y="2604984"/>
-            <a:ext cx="439971" cy="434763"/>
-          </a:xfrm>
-          <a:prstGeom prst="ellipse">
+          <p:cNvPr id="10" name="テキスト ボックス 9">
+            <a:extLst>
+              <a:ext uri="{FF2B5EF4-FFF2-40B4-BE49-F238E27FC236}">
+                <a16:creationId xmlns:a16="http://schemas.microsoft.com/office/drawing/2014/main" id="{9BDE07A3-7140-FC73-19CE-6A04C7DB080D}"/>
+              </a:ext>
+            </a:extLst>
+          </p:cNvPr>
+          <p:cNvSpPr txBox="1"/>
+          <p:nvPr/>
+        </p:nvSpPr>
+        <p:spPr>
+          <a:xfrm>
+            <a:off x="5383673" y="2504195"/>
+            <a:ext cx="746970" cy="369332"/>
+          </a:xfrm>
+          <a:prstGeom prst="rect">
             <a:avLst/>
           </a:prstGeom>
           <a:noFill/>
-          <a:ln>
-            <a:solidFill>
-              <a:schemeClr val="tx1"/>
-            </a:solidFill>
-          </a:ln>
-        </p:spPr>
-        <p:style>
-          <a:lnRef idx="2">
-            <a:schemeClr val="accent1">
-              <a:shade val="50000"/>
-            </a:schemeClr>
-          </a:lnRef>
-          <a:fillRef idx="1">
-            <a:schemeClr val="accent1"/>
-          </a:fillRef>
-          <a:effectRef idx="0">
-            <a:schemeClr val="accent1"/>
-          </a:effectRef>
-          <a:fontRef idx="minor">
-            <a:schemeClr val="lt1"/>
-          </a:fontRef>
-        </p:style>
-        <p:txBody>
-          <a:bodyPr rtlCol="0" anchor="ctr"/>
+        </p:spPr>
+        <p:txBody>
+          <a:bodyPr wrap="square" rtlCol="0">
+            <a:spAutoFit/>
+          </a:bodyPr>
           <a:lstStyle/>
           <a:p>
             <a:pPr algn="ctr"/>
             <a:r>
               <a:rPr lang="en-US" altLang="ja-JP" dirty="0">
                 <a:solidFill>
-                  <a:schemeClr val="tx1"/>
+                  <a:schemeClr val="accent1"/>
                 </a:solidFill>
               </a:rPr>
-              <a:t>0</a:t>
+              <a:t>0.84</a:t>
             </a:r>
             <a:endParaRPr kumimoji="1" lang="ja-JP" altLang="en-US" dirty="0">
               <a:solidFill>
-                <a:schemeClr val="tx1"/>
+                <a:schemeClr val="accent1"/>
               </a:solidFill>
             </a:endParaRPr>
           </a:p>
@@ -7263,32 +7479,30 @@
       </p:sp>
       <p:cxnSp>
         <p:nvCxnSpPr>
-          <p:cNvPr id="101" name="直線コネクタ 100">
-            <a:extLst>
-              <a:ext uri="{FF2B5EF4-FFF2-40B4-BE49-F238E27FC236}">
-                <a16:creationId xmlns:a16="http://schemas.microsoft.com/office/drawing/2014/main" id="{662F5556-2EA0-97A9-8869-4603EFD5B92B}"/>
+          <p:cNvPr id="17" name="直線矢印コネクタ 16">
+            <a:extLst>
+              <a:ext uri="{FF2B5EF4-FFF2-40B4-BE49-F238E27FC236}">
+                <a16:creationId xmlns:a16="http://schemas.microsoft.com/office/drawing/2014/main" id="{A028723B-8CC3-88A1-0059-821AD72245C9}"/>
               </a:ext>
             </a:extLst>
           </p:cNvPr>
           <p:cNvCxnSpPr>
             <a:cxnSpLocks/>
-            <a:stCxn id="102" idx="6"/>
-            <a:endCxn id="51" idx="2"/>
+            <a:stCxn id="34" idx="1"/>
+            <a:endCxn id="6" idx="3"/>
           </p:cNvCxnSpPr>
           <p:nvPr/>
         </p:nvCxnSpPr>
         <p:spPr>
-          <a:xfrm>
-            <a:off x="4478935" y="4470397"/>
-            <a:ext cx="556481" cy="0"/>
-          </a:xfrm>
-          <a:prstGeom prst="line">
-            <a:avLst/>
-          </a:prstGeom>
-          <a:ln>
-            <a:solidFill>
-              <a:schemeClr val="tx1"/>
-            </a:solidFill>
+          <a:xfrm flipV="1">
+            <a:off x="4368158" y="4006701"/>
+            <a:ext cx="0" cy="1296738"/>
+          </a:xfrm>
+          <a:prstGeom prst="straightConnector1">
+            <a:avLst/>
+          </a:prstGeom>
+          <a:ln w="12700">
+            <a:tailEnd type="triangle"/>
           </a:ln>
         </p:spPr>
         <p:style>
@@ -7308,63 +7522,44 @@
       </p:cxnSp>
       <p:sp>
         <p:nvSpPr>
-          <p:cNvPr id="102" name="楕円 101">
-            <a:extLst>
-              <a:ext uri="{FF2B5EF4-FFF2-40B4-BE49-F238E27FC236}">
-                <a16:creationId xmlns:a16="http://schemas.microsoft.com/office/drawing/2014/main" id="{5109BDEE-2DC4-30E4-B752-3C1E79E02695}"/>
-              </a:ext>
-            </a:extLst>
-          </p:cNvPr>
-          <p:cNvSpPr/>
-          <p:nvPr/>
-        </p:nvSpPr>
-        <p:spPr>
-          <a:xfrm>
-            <a:off x="4038964" y="4253015"/>
-            <a:ext cx="439971" cy="434763"/>
-          </a:xfrm>
-          <a:prstGeom prst="ellipse">
+          <p:cNvPr id="21" name="テキスト ボックス 20">
+            <a:extLst>
+              <a:ext uri="{FF2B5EF4-FFF2-40B4-BE49-F238E27FC236}">
+                <a16:creationId xmlns:a16="http://schemas.microsoft.com/office/drawing/2014/main" id="{D3844F71-EAFD-EE8A-AB25-F56ABB60C928}"/>
+              </a:ext>
+            </a:extLst>
+          </p:cNvPr>
+          <p:cNvSpPr txBox="1"/>
+          <p:nvPr/>
+        </p:nvSpPr>
+        <p:spPr>
+          <a:xfrm>
+            <a:off x="3608774" y="4454321"/>
+            <a:ext cx="746970" cy="369332"/>
+          </a:xfrm>
+          <a:prstGeom prst="rect">
             <a:avLst/>
           </a:prstGeom>
           <a:noFill/>
-          <a:ln>
-            <a:solidFill>
-              <a:schemeClr val="tx1"/>
-            </a:solidFill>
-          </a:ln>
-        </p:spPr>
-        <p:style>
-          <a:lnRef idx="2">
-            <a:schemeClr val="accent1">
-              <a:shade val="50000"/>
-            </a:schemeClr>
-          </a:lnRef>
-          <a:fillRef idx="1">
-            <a:schemeClr val="accent1"/>
-          </a:fillRef>
-          <a:effectRef idx="0">
-            <a:schemeClr val="accent1"/>
-          </a:effectRef>
-          <a:fontRef idx="minor">
-            <a:schemeClr val="lt1"/>
-          </a:fontRef>
-        </p:style>
-        <p:txBody>
-          <a:bodyPr rtlCol="0" anchor="ctr"/>
+        </p:spPr>
+        <p:txBody>
+          <a:bodyPr wrap="square" rtlCol="0">
+            <a:spAutoFit/>
+          </a:bodyPr>
           <a:lstStyle/>
           <a:p>
             <a:pPr algn="ctr"/>
             <a:r>
               <a:rPr kumimoji="1" lang="en-US" altLang="ja-JP" dirty="0">
                 <a:solidFill>
-                  <a:schemeClr val="tx1"/>
+                  <a:schemeClr val="accent1"/>
                 </a:solidFill>
               </a:rPr>
-              <a:t>3</a:t>
+              <a:t>0.70</a:t>
             </a:r>
             <a:endParaRPr kumimoji="1" lang="ja-JP" altLang="en-US" dirty="0">
               <a:solidFill>
-                <a:schemeClr val="tx1"/>
+                <a:schemeClr val="accent1"/>
               </a:solidFill>
             </a:endParaRPr>
           </a:p>
@@ -7372,32 +7567,34 @@
       </p:sp>
       <p:cxnSp>
         <p:nvCxnSpPr>
-          <p:cNvPr id="103" name="直線コネクタ 102">
-            <a:extLst>
-              <a:ext uri="{FF2B5EF4-FFF2-40B4-BE49-F238E27FC236}">
-                <a16:creationId xmlns:a16="http://schemas.microsoft.com/office/drawing/2014/main" id="{69C44B0D-BF3C-6EB1-41C9-F231BD414390}"/>
+          <p:cNvPr id="22" name="コネクタ: 曲線 21">
+            <a:extLst>
+              <a:ext uri="{FF2B5EF4-FFF2-40B4-BE49-F238E27FC236}">
+                <a16:creationId xmlns:a16="http://schemas.microsoft.com/office/drawing/2014/main" id="{A094ECB0-DC0F-01F6-6411-A2EB4B33D81B}"/>
               </a:ext>
             </a:extLst>
           </p:cNvPr>
           <p:cNvCxnSpPr>
             <a:cxnSpLocks/>
-            <a:stCxn id="104" idx="6"/>
-            <a:endCxn id="102" idx="2"/>
+            <a:stCxn id="51" idx="5"/>
+            <a:endCxn id="51" idx="7"/>
           </p:cNvCxnSpPr>
           <p:nvPr/>
         </p:nvCxnSpPr>
         <p:spPr>
-          <a:xfrm>
-            <a:off x="3482482" y="4470397"/>
-            <a:ext cx="556482" cy="0"/>
-          </a:xfrm>
-          <a:prstGeom prst="line">
-            <a:avLst/>
-          </a:prstGeom>
-          <a:ln>
-            <a:solidFill>
-              <a:schemeClr val="tx1"/>
-            </a:solidFill>
+          <a:xfrm rot="5400000" flipH="1">
+            <a:off x="7780430" y="3846637"/>
+            <a:ext cx="307423" cy="12700"/>
+          </a:xfrm>
+          <a:prstGeom prst="curvedConnector5">
+            <a:avLst>
+              <a:gd name="adj1" fmla="val -74360"/>
+              <a:gd name="adj2" fmla="val -4778386"/>
+              <a:gd name="adj3" fmla="val 174360"/>
+            </a:avLst>
+          </a:prstGeom>
+          <a:ln w="12700">
+            <a:tailEnd type="triangle"/>
           </a:ln>
         </p:spPr>
         <p:style>
@@ -7415,98 +7612,36 @@
           </a:fontRef>
         </p:style>
       </p:cxnSp>
-      <p:sp>
-        <p:nvSpPr>
-          <p:cNvPr id="104" name="楕円 103">
-            <a:extLst>
-              <a:ext uri="{FF2B5EF4-FFF2-40B4-BE49-F238E27FC236}">
-                <a16:creationId xmlns:a16="http://schemas.microsoft.com/office/drawing/2014/main" id="{7CC5E67B-17EA-0E0D-DC4D-17F23BA87DB7}"/>
-              </a:ext>
-            </a:extLst>
-          </p:cNvPr>
-          <p:cNvSpPr/>
-          <p:nvPr/>
-        </p:nvSpPr>
-        <p:spPr>
-          <a:xfrm>
-            <a:off x="3042511" y="4253015"/>
-            <a:ext cx="439971" cy="434763"/>
-          </a:xfrm>
-          <a:prstGeom prst="ellipse">
-            <a:avLst/>
-          </a:prstGeom>
-          <a:noFill/>
-          <a:ln>
-            <a:solidFill>
-              <a:schemeClr val="tx1"/>
-            </a:solidFill>
-          </a:ln>
-        </p:spPr>
-        <p:style>
-          <a:lnRef idx="2">
-            <a:schemeClr val="accent1">
-              <a:shade val="50000"/>
-            </a:schemeClr>
-          </a:lnRef>
-          <a:fillRef idx="1">
-            <a:schemeClr val="accent1"/>
-          </a:fillRef>
-          <a:effectRef idx="0">
-            <a:schemeClr val="accent1"/>
-          </a:effectRef>
-          <a:fontRef idx="minor">
-            <a:schemeClr val="lt1"/>
-          </a:fontRef>
-        </p:style>
-        <p:txBody>
-          <a:bodyPr rtlCol="0" anchor="ctr"/>
-          <a:lstStyle/>
-          <a:p>
-            <a:pPr algn="ctr"/>
-            <a:r>
-              <a:rPr lang="en-US" altLang="ja-JP" dirty="0">
-                <a:solidFill>
-                  <a:schemeClr val="tx1"/>
-                </a:solidFill>
-              </a:rPr>
-              <a:t>0</a:t>
-            </a:r>
-            <a:endParaRPr kumimoji="1" lang="ja-JP" altLang="en-US" dirty="0">
-              <a:solidFill>
-                <a:schemeClr val="tx1"/>
-              </a:solidFill>
-            </a:endParaRPr>
-          </a:p>
-        </p:txBody>
-      </p:sp>
       <p:cxnSp>
         <p:nvCxnSpPr>
-          <p:cNvPr id="3" name="直線コネクタ 2">
-            <a:extLst>
-              <a:ext uri="{FF2B5EF4-FFF2-40B4-BE49-F238E27FC236}">
-                <a16:creationId xmlns:a16="http://schemas.microsoft.com/office/drawing/2014/main" id="{77AFF6F8-9CA7-9910-00AE-6EAC8F2AB456}"/>
+          <p:cNvPr id="29" name="直線矢印コネクタ 28">
+            <a:extLst>
+              <a:ext uri="{FF2B5EF4-FFF2-40B4-BE49-F238E27FC236}">
+                <a16:creationId xmlns:a16="http://schemas.microsoft.com/office/drawing/2014/main" id="{420F8B77-7778-5F0E-1BAC-6874CB037A8E}"/>
               </a:ext>
             </a:extLst>
           </p:cNvPr>
           <p:cNvCxnSpPr>
             <a:cxnSpLocks/>
-            <a:stCxn id="6" idx="6"/>
-            <a:endCxn id="90" idx="2"/>
+            <a:stCxn id="32" idx="1"/>
+            <a:endCxn id="5" idx="3"/>
           </p:cNvCxnSpPr>
           <p:nvPr/>
         </p:nvCxnSpPr>
         <p:spPr>
-          <a:xfrm>
-            <a:off x="2469954" y="1956148"/>
-            <a:ext cx="556482" cy="0"/>
-          </a:xfrm>
-          <a:prstGeom prst="line">
-            <a:avLst/>
-          </a:prstGeom>
-          <a:ln>
+          <a:xfrm flipV="1">
+            <a:off x="5920240" y="3994804"/>
+            <a:ext cx="0" cy="1308635"/>
+          </a:xfrm>
+          <a:prstGeom prst="straightConnector1">
+            <a:avLst/>
+          </a:prstGeom>
+          <a:ln w="12700">
             <a:solidFill>
-              <a:schemeClr val="tx1"/>
+              <a:schemeClr val="accent2"/>
             </a:solidFill>
+            <a:prstDash val="sysDash"/>
+            <a:tailEnd type="triangle"/>
           </a:ln>
         </p:spPr>
         <p:style>
@@ -7524,98 +7659,40 @@
           </a:fontRef>
         </p:style>
       </p:cxnSp>
-      <p:sp>
-        <p:nvSpPr>
-          <p:cNvPr id="6" name="楕円 5">
-            <a:extLst>
-              <a:ext uri="{FF2B5EF4-FFF2-40B4-BE49-F238E27FC236}">
-                <a16:creationId xmlns:a16="http://schemas.microsoft.com/office/drawing/2014/main" id="{77D87AF6-6053-0E5E-41FC-835957BA1897}"/>
-              </a:ext>
-            </a:extLst>
-          </p:cNvPr>
-          <p:cNvSpPr/>
-          <p:nvPr/>
-        </p:nvSpPr>
-        <p:spPr>
-          <a:xfrm>
-            <a:off x="2029983" y="1738766"/>
-            <a:ext cx="439971" cy="434763"/>
-          </a:xfrm>
-          <a:prstGeom prst="ellipse">
-            <a:avLst/>
-          </a:prstGeom>
-          <a:noFill/>
-          <a:ln>
-            <a:solidFill>
-              <a:schemeClr val="tx1"/>
-            </a:solidFill>
-          </a:ln>
-        </p:spPr>
-        <p:style>
-          <a:lnRef idx="2">
-            <a:schemeClr val="accent1">
-              <a:shade val="50000"/>
-            </a:schemeClr>
-          </a:lnRef>
-          <a:fillRef idx="1">
-            <a:schemeClr val="accent1"/>
-          </a:fillRef>
-          <a:effectRef idx="0">
-            <a:schemeClr val="accent1"/>
-          </a:effectRef>
-          <a:fontRef idx="minor">
-            <a:schemeClr val="lt1"/>
-          </a:fontRef>
-        </p:style>
-        <p:txBody>
-          <a:bodyPr rtlCol="0" anchor="ctr"/>
-          <a:lstStyle/>
-          <a:p>
-            <a:pPr algn="ctr"/>
-            <a:r>
-              <a:rPr lang="en-US" altLang="ja-JP" dirty="0">
-                <a:solidFill>
-                  <a:schemeClr val="tx1"/>
-                </a:solidFill>
-              </a:rPr>
-              <a:t>0</a:t>
-            </a:r>
-            <a:endParaRPr kumimoji="1" lang="ja-JP" altLang="en-US" dirty="0">
-              <a:solidFill>
-                <a:schemeClr val="tx1"/>
-              </a:solidFill>
-            </a:endParaRPr>
-          </a:p>
-        </p:txBody>
-      </p:sp>
       <p:cxnSp>
         <p:nvCxnSpPr>
-          <p:cNvPr id="8" name="直線コネクタ 7">
-            <a:extLst>
-              <a:ext uri="{FF2B5EF4-FFF2-40B4-BE49-F238E27FC236}">
-                <a16:creationId xmlns:a16="http://schemas.microsoft.com/office/drawing/2014/main" id="{580E5ABF-203F-5B48-A798-845CE32C6FD7}"/>
+          <p:cNvPr id="36" name="コネクタ: 曲線 35">
+            <a:extLst>
+              <a:ext uri="{FF2B5EF4-FFF2-40B4-BE49-F238E27FC236}">
+                <a16:creationId xmlns:a16="http://schemas.microsoft.com/office/drawing/2014/main" id="{E9708A82-AAC9-9FC8-AAD1-C1F2911D16C5}"/>
               </a:ext>
             </a:extLst>
           </p:cNvPr>
           <p:cNvCxnSpPr>
             <a:cxnSpLocks/>
-            <a:stCxn id="51" idx="6"/>
-            <a:endCxn id="20" idx="2"/>
+            <a:stCxn id="51" idx="5"/>
+            <a:endCxn id="51" idx="7"/>
           </p:cNvCxnSpPr>
           <p:nvPr/>
         </p:nvCxnSpPr>
         <p:spPr>
-          <a:xfrm>
-            <a:off x="5475387" y="4470397"/>
-            <a:ext cx="527877" cy="2"/>
-          </a:xfrm>
-          <a:prstGeom prst="line">
-            <a:avLst/>
-          </a:prstGeom>
-          <a:ln>
+          <a:xfrm rot="5400000" flipH="1">
+            <a:off x="7780430" y="3846637"/>
+            <a:ext cx="307423" cy="12700"/>
+          </a:xfrm>
+          <a:prstGeom prst="curvedConnector5">
+            <a:avLst>
+              <a:gd name="adj1" fmla="val -74360"/>
+              <a:gd name="adj2" fmla="val -3406961"/>
+              <a:gd name="adj3" fmla="val 174360"/>
+            </a:avLst>
+          </a:prstGeom>
+          <a:ln w="12700">
             <a:solidFill>
-              <a:schemeClr val="tx1"/>
+              <a:schemeClr val="accent2"/>
             </a:solidFill>
+            <a:prstDash val="sysDash"/>
+            <a:tailEnd type="triangle"/>
           </a:ln>
         </p:spPr>
         <p:style>
@@ -7633,12 +7710,59 @@
           </a:fontRef>
         </p:style>
       </p:cxnSp>
-      <p:sp>
-        <p:nvSpPr>
-          <p:cNvPr id="17" name="テキスト ボックス 16">
-            <a:extLst>
-              <a:ext uri="{FF2B5EF4-FFF2-40B4-BE49-F238E27FC236}">
-                <a16:creationId xmlns:a16="http://schemas.microsoft.com/office/drawing/2014/main" id="{77F8248F-EC1B-F5BD-3376-79D13122BF0D}"/>
+      <p:cxnSp>
+        <p:nvCxnSpPr>
+          <p:cNvPr id="42" name="直線矢印コネクタ 41">
+            <a:extLst>
+              <a:ext uri="{FF2B5EF4-FFF2-40B4-BE49-F238E27FC236}">
+                <a16:creationId xmlns:a16="http://schemas.microsoft.com/office/drawing/2014/main" id="{4B563C0B-E26B-A1A5-D16B-052A590E7345}"/>
+              </a:ext>
+            </a:extLst>
+          </p:cNvPr>
+          <p:cNvCxnSpPr>
+            <a:cxnSpLocks/>
+            <a:stCxn id="51" idx="3"/>
+            <a:endCxn id="5" idx="5"/>
+          </p:cNvCxnSpPr>
+          <p:nvPr/>
+        </p:nvCxnSpPr>
+        <p:spPr>
+          <a:xfrm flipH="1" flipV="1">
+            <a:off x="6231347" y="3994804"/>
+            <a:ext cx="1391688" cy="5544"/>
+          </a:xfrm>
+          <a:prstGeom prst="straightConnector1">
+            <a:avLst/>
+          </a:prstGeom>
+          <a:ln w="12700">
+            <a:solidFill>
+              <a:schemeClr val="accent2"/>
+            </a:solidFill>
+            <a:prstDash val="sysDash"/>
+            <a:tailEnd type="triangle"/>
+          </a:ln>
+        </p:spPr>
+        <p:style>
+          <a:lnRef idx="1">
+            <a:schemeClr val="accent1"/>
+          </a:lnRef>
+          <a:fillRef idx="0">
+            <a:schemeClr val="accent1"/>
+          </a:fillRef>
+          <a:effectRef idx="0">
+            <a:schemeClr val="accent1"/>
+          </a:effectRef>
+          <a:fontRef idx="minor">
+            <a:schemeClr val="tx1"/>
+          </a:fontRef>
+        </p:style>
+      </p:cxnSp>
+      <p:sp>
+        <p:nvSpPr>
+          <p:cNvPr id="47" name="テキスト ボックス 46">
+            <a:extLst>
+              <a:ext uri="{FF2B5EF4-FFF2-40B4-BE49-F238E27FC236}">
+                <a16:creationId xmlns:a16="http://schemas.microsoft.com/office/drawing/2014/main" id="{FFA93F59-F99C-CFCC-886B-A4157EBA74BB}"/>
               </a:ext>
             </a:extLst>
           </p:cNvPr>
@@ -7647,8 +7771,8 @@
         </p:nvSpPr>
         <p:spPr>
           <a:xfrm>
-            <a:off x="1930400" y="766629"/>
-            <a:ext cx="8331200" cy="646331"/>
+            <a:off x="6500484" y="4056713"/>
+            <a:ext cx="746970" cy="369332"/>
           </a:xfrm>
           <a:prstGeom prst="rect">
             <a:avLst/>
@@ -7661,123 +7785,403 @@
           </a:bodyPr>
           <a:lstStyle/>
           <a:p>
-            <a:r>
-              <a:rPr lang="en-US" altLang="ja-JP" b="0" i="0" dirty="0">
+            <a:pPr algn="ctr"/>
+            <a:r>
+              <a:rPr lang="en-US" altLang="ja-JP" dirty="0">
                 <a:solidFill>
-                  <a:srgbClr val="212121"/>
+                  <a:schemeClr val="accent2"/>
                 </a:solidFill>
-                <a:effectLst/>
-                <a:latin typeface="Courier New" panose="02070309020205020404" pitchFamily="49" charset="0"/>
               </a:rPr>
-              <a:t>The probability that all labels are outputted along the most likely state transition: -20.665214012469935</a:t>
-            </a:r>
-            <a:r>
-              <a:rPr lang="ja-JP" altLang="en-US" b="0" i="0" dirty="0">
-                <a:solidFill>
-                  <a:srgbClr val="212121"/>
-                </a:solidFill>
-                <a:effectLst/>
-                <a:latin typeface="Courier New" panose="02070309020205020404" pitchFamily="49" charset="0"/>
-              </a:rPr>
-              <a:t>（対数表示）</a:t>
-            </a:r>
-            <a:endParaRPr kumimoji="1" lang="ja-JP" altLang="en-US" dirty="0"/>
-          </a:p>
-        </p:txBody>
-      </p:sp>
-      <p:pic>
-        <p:nvPicPr>
-          <p:cNvPr id="7" name="Picture 2">
-            <a:extLst>
-              <a:ext uri="{FF2B5EF4-FFF2-40B4-BE49-F238E27FC236}">
-                <a16:creationId xmlns:a16="http://schemas.microsoft.com/office/drawing/2014/main" id="{CA3F96F3-4825-9A04-35FF-4A2197DE1CBF}"/>
-              </a:ext>
-            </a:extLst>
-          </p:cNvPr>
-          <p:cNvPicPr>
-            <a:picLocks noChangeAspect="1" noChangeArrowheads="1"/>
-          </p:cNvPicPr>
-          <p:nvPr/>
-        </p:nvPicPr>
-        <p:blipFill>
-          <a:blip r:embed="rId2">
-            <a:extLst>
-              <a:ext uri="{28A0092B-C50C-407E-A947-70E740481C1C}">
-                <a14:useLocalDpi xmlns:a14="http://schemas.microsoft.com/office/drawing/2010/main" val="0"/>
-              </a:ext>
-            </a:extLst>
-          </a:blip>
-          <a:srcRect/>
-          <a:stretch>
-            <a:fillRect/>
-          </a:stretch>
-        </p:blipFill>
-        <p:spPr bwMode="auto">
-          <a:xfrm>
-            <a:off x="6971112" y="4253013"/>
-            <a:ext cx="4147083" cy="1840492"/>
+              <a:t>0.32</a:t>
+            </a:r>
+            <a:endParaRPr kumimoji="1" lang="ja-JP" altLang="en-US" dirty="0">
+              <a:solidFill>
+                <a:schemeClr val="accent2"/>
+              </a:solidFill>
+            </a:endParaRPr>
+          </a:p>
+        </p:txBody>
+      </p:sp>
+      <p:cxnSp>
+        <p:nvCxnSpPr>
+          <p:cNvPr id="58" name="直線矢印コネクタ 57">
+            <a:extLst>
+              <a:ext uri="{FF2B5EF4-FFF2-40B4-BE49-F238E27FC236}">
+                <a16:creationId xmlns:a16="http://schemas.microsoft.com/office/drawing/2014/main" id="{942EAA3F-2139-9464-47A2-632B8C901257}"/>
+              </a:ext>
+            </a:extLst>
+          </p:cNvPr>
+          <p:cNvCxnSpPr>
+            <a:cxnSpLocks/>
+            <a:stCxn id="34" idx="7"/>
+            <a:endCxn id="6" idx="5"/>
+          </p:cNvCxnSpPr>
+          <p:nvPr/>
+        </p:nvCxnSpPr>
+        <p:spPr>
+          <a:xfrm flipV="1">
+            <a:off x="4679265" y="4006701"/>
+            <a:ext cx="0" cy="1296738"/>
+          </a:xfrm>
+          <a:prstGeom prst="straightConnector1">
+            <a:avLst/>
+          </a:prstGeom>
+          <a:ln w="12700">
+            <a:solidFill>
+              <a:schemeClr val="accent2"/>
+            </a:solidFill>
+            <a:prstDash val="sysDash"/>
+            <a:tailEnd type="triangle"/>
+          </a:ln>
+        </p:spPr>
+        <p:style>
+          <a:lnRef idx="1">
+            <a:schemeClr val="accent1"/>
+          </a:lnRef>
+          <a:fillRef idx="0">
+            <a:schemeClr val="accent1"/>
+          </a:fillRef>
+          <a:effectRef idx="0">
+            <a:schemeClr val="accent1"/>
+          </a:effectRef>
+          <a:fontRef idx="minor">
+            <a:schemeClr val="tx1"/>
+          </a:fontRef>
+        </p:style>
+      </p:cxnSp>
+      <p:sp>
+        <p:nvSpPr>
+          <p:cNvPr id="66" name="テキスト ボックス 65">
+            <a:extLst>
+              <a:ext uri="{FF2B5EF4-FFF2-40B4-BE49-F238E27FC236}">
+                <a16:creationId xmlns:a16="http://schemas.microsoft.com/office/drawing/2014/main" id="{638172E6-09B7-B71F-DB55-17622CE95577}"/>
+              </a:ext>
+            </a:extLst>
+          </p:cNvPr>
+          <p:cNvSpPr txBox="1"/>
+          <p:nvPr/>
+        </p:nvSpPr>
+        <p:spPr>
+          <a:xfrm>
+            <a:off x="4593027" y="4464455"/>
+            <a:ext cx="746970" cy="369332"/>
           </a:xfrm>
           <a:prstGeom prst="rect">
             <a:avLst/>
           </a:prstGeom>
           <a:noFill/>
-          <a:extLst>
-            <a:ext uri="{909E8E84-426E-40DD-AFC4-6F175D3DCCD1}">
-              <a14:hiddenFill xmlns:a14="http://schemas.microsoft.com/office/drawing/2010/main">
-                <a:solidFill>
-                  <a:srgbClr val="FFFFFF"/>
-                </a:solidFill>
-              </a14:hiddenFill>
-            </a:ext>
-          </a:extLst>
-        </p:spPr>
-      </p:pic>
-      <p:sp>
-        <p:nvSpPr>
-          <p:cNvPr id="9" name="テキスト ボックス 8">
-            <a:extLst>
-              <a:ext uri="{FF2B5EF4-FFF2-40B4-BE49-F238E27FC236}">
-                <a16:creationId xmlns:a16="http://schemas.microsoft.com/office/drawing/2014/main" id="{0DEF869F-3A57-BE9F-2C71-727D9F4AFD3C}"/>
-              </a:ext>
-            </a:extLst>
-          </p:cNvPr>
-          <p:cNvSpPr txBox="1"/>
-          <p:nvPr/>
-        </p:nvSpPr>
-        <p:spPr>
-          <a:xfrm>
-            <a:off x="8874825" y="5906705"/>
-            <a:ext cx="974889" cy="369332"/>
-          </a:xfrm>
-          <a:prstGeom prst="rect">
-            <a:avLst/>
-          </a:prstGeom>
-          <a:noFill/>
-        </p:spPr>
-        <p:txBody>
-          <a:bodyPr wrap="square">
+        </p:spPr>
+        <p:txBody>
+          <a:bodyPr wrap="square" rtlCol="0">
             <a:spAutoFit/>
           </a:bodyPr>
           <a:lstStyle/>
           <a:p>
-            <a:pPr algn="l"/>
-            <a:r>
-              <a:rPr lang="en-US" altLang="ja-JP" b="1" i="0" dirty="0">
+            <a:pPr algn="ctr"/>
+            <a:r>
+              <a:rPr lang="en-US" altLang="ja-JP" dirty="0">
                 <a:solidFill>
-                  <a:srgbClr val="000000"/>
+                  <a:schemeClr val="accent2"/>
                 </a:solidFill>
-                <a:effectLst/>
-                <a:latin typeface="arial" panose="020B0604020202020204" pitchFamily="34" charset="0"/>
               </a:rPr>
-              <a:t>SNFG</a:t>
-            </a:r>
+              <a:t>0.30</a:t>
+            </a:r>
+            <a:endParaRPr kumimoji="1" lang="ja-JP" altLang="en-US" dirty="0">
+              <a:solidFill>
+                <a:schemeClr val="accent2"/>
+              </a:solidFill>
+            </a:endParaRPr>
+          </a:p>
+        </p:txBody>
+      </p:sp>
+      <p:cxnSp>
+        <p:nvCxnSpPr>
+          <p:cNvPr id="68" name="コネクタ: 曲線 67">
+            <a:extLst>
+              <a:ext uri="{FF2B5EF4-FFF2-40B4-BE49-F238E27FC236}">
+                <a16:creationId xmlns:a16="http://schemas.microsoft.com/office/drawing/2014/main" id="{585B3F31-68FE-C6CC-502A-14B0D4DF4138}"/>
+              </a:ext>
+            </a:extLst>
+          </p:cNvPr>
+          <p:cNvCxnSpPr>
+            <a:cxnSpLocks/>
+            <a:stCxn id="34" idx="3"/>
+            <a:endCxn id="34" idx="1"/>
+          </p:cNvCxnSpPr>
+          <p:nvPr/>
+        </p:nvCxnSpPr>
+        <p:spPr>
+          <a:xfrm rot="5400000" flipH="1">
+            <a:off x="4214446" y="5457151"/>
+            <a:ext cx="307423" cy="12700"/>
+          </a:xfrm>
+          <a:prstGeom prst="curvedConnector5">
+            <a:avLst>
+              <a:gd name="adj1" fmla="val -74360"/>
+              <a:gd name="adj2" fmla="val 3271268"/>
+              <a:gd name="adj3" fmla="val 174360"/>
+            </a:avLst>
+          </a:prstGeom>
+          <a:ln w="12700">
+            <a:solidFill>
+              <a:schemeClr val="accent2"/>
+            </a:solidFill>
+            <a:prstDash val="sysDash"/>
+            <a:tailEnd type="triangle"/>
+          </a:ln>
+        </p:spPr>
+        <p:style>
+          <a:lnRef idx="1">
+            <a:schemeClr val="accent1"/>
+          </a:lnRef>
+          <a:fillRef idx="0">
+            <a:schemeClr val="accent1"/>
+          </a:fillRef>
+          <a:effectRef idx="0">
+            <a:schemeClr val="accent1"/>
+          </a:effectRef>
+          <a:fontRef idx="minor">
+            <a:schemeClr val="tx1"/>
+          </a:fontRef>
+        </p:style>
+      </p:cxnSp>
+      <p:sp>
+        <p:nvSpPr>
+          <p:cNvPr id="73" name="テキスト ボックス 72">
+            <a:extLst>
+              <a:ext uri="{FF2B5EF4-FFF2-40B4-BE49-F238E27FC236}">
+                <a16:creationId xmlns:a16="http://schemas.microsoft.com/office/drawing/2014/main" id="{A4C065ED-11F8-F0AE-DE2E-7A9D7C4E3057}"/>
+              </a:ext>
+            </a:extLst>
+          </p:cNvPr>
+          <p:cNvSpPr txBox="1"/>
+          <p:nvPr/>
+        </p:nvSpPr>
+        <p:spPr>
+          <a:xfrm>
+            <a:off x="3107983" y="5442216"/>
+            <a:ext cx="746970" cy="369332"/>
+          </a:xfrm>
+          <a:prstGeom prst="rect">
+            <a:avLst/>
+          </a:prstGeom>
+          <a:noFill/>
+        </p:spPr>
+        <p:txBody>
+          <a:bodyPr wrap="square" rtlCol="0">
+            <a:spAutoFit/>
+          </a:bodyPr>
+          <a:lstStyle/>
+          <a:p>
+            <a:pPr algn="ctr"/>
+            <a:r>
+              <a:rPr kumimoji="1" lang="en-US" altLang="ja-JP" dirty="0">
+                <a:solidFill>
+                  <a:schemeClr val="accent2"/>
+                </a:solidFill>
+              </a:rPr>
+              <a:t>0.70</a:t>
+            </a:r>
+            <a:endParaRPr kumimoji="1" lang="ja-JP" altLang="en-US" dirty="0">
+              <a:solidFill>
+                <a:schemeClr val="accent2"/>
+              </a:solidFill>
+            </a:endParaRPr>
+          </a:p>
+        </p:txBody>
+      </p:sp>
+      <p:cxnSp>
+        <p:nvCxnSpPr>
+          <p:cNvPr id="75" name="コネクタ: 曲線 74">
+            <a:extLst>
+              <a:ext uri="{FF2B5EF4-FFF2-40B4-BE49-F238E27FC236}">
+                <a16:creationId xmlns:a16="http://schemas.microsoft.com/office/drawing/2014/main" id="{A363525E-8293-DB8B-7E65-D852D6FC8F14}"/>
+              </a:ext>
+            </a:extLst>
+          </p:cNvPr>
+          <p:cNvCxnSpPr>
+            <a:cxnSpLocks/>
+            <a:stCxn id="2" idx="5"/>
+            <a:endCxn id="2" idx="7"/>
+          </p:cNvCxnSpPr>
+          <p:nvPr/>
+        </p:nvCxnSpPr>
+        <p:spPr>
+          <a:xfrm rot="5400000" flipH="1">
+            <a:off x="4988736" y="1957735"/>
+            <a:ext cx="307423" cy="12700"/>
+          </a:xfrm>
+          <a:prstGeom prst="curvedConnector5">
+            <a:avLst>
+              <a:gd name="adj1" fmla="val -74360"/>
+              <a:gd name="adj2" fmla="val -5121252"/>
+              <a:gd name="adj3" fmla="val 174360"/>
+            </a:avLst>
+          </a:prstGeom>
+          <a:ln w="12700">
+            <a:solidFill>
+              <a:schemeClr val="accent2"/>
+            </a:solidFill>
+            <a:prstDash val="sysDash"/>
+            <a:tailEnd type="triangle"/>
+          </a:ln>
+        </p:spPr>
+        <p:style>
+          <a:lnRef idx="1">
+            <a:schemeClr val="accent1"/>
+          </a:lnRef>
+          <a:fillRef idx="0">
+            <a:schemeClr val="accent1"/>
+          </a:fillRef>
+          <a:effectRef idx="0">
+            <a:schemeClr val="accent1"/>
+          </a:effectRef>
+          <a:fontRef idx="minor">
+            <a:schemeClr val="tx1"/>
+          </a:fontRef>
+        </p:style>
+      </p:cxnSp>
+      <p:sp>
+        <p:nvSpPr>
+          <p:cNvPr id="81" name="テキスト ボックス 80">
+            <a:extLst>
+              <a:ext uri="{FF2B5EF4-FFF2-40B4-BE49-F238E27FC236}">
+                <a16:creationId xmlns:a16="http://schemas.microsoft.com/office/drawing/2014/main" id="{A431AC9F-F1C3-4002-953A-BC0A834C2F7A}"/>
+              </a:ext>
+            </a:extLst>
+          </p:cNvPr>
+          <p:cNvSpPr txBox="1"/>
+          <p:nvPr/>
+        </p:nvSpPr>
+        <p:spPr>
+          <a:xfrm>
+            <a:off x="5757575" y="1771182"/>
+            <a:ext cx="746970" cy="369332"/>
+          </a:xfrm>
+          <a:prstGeom prst="rect">
+            <a:avLst/>
+          </a:prstGeom>
+          <a:noFill/>
+        </p:spPr>
+        <p:txBody>
+          <a:bodyPr wrap="square" rtlCol="0">
+            <a:spAutoFit/>
+          </a:bodyPr>
+          <a:lstStyle/>
+          <a:p>
+            <a:pPr algn="ctr"/>
+            <a:r>
+              <a:rPr kumimoji="1" lang="en-US" altLang="ja-JP" dirty="0">
+                <a:solidFill>
+                  <a:schemeClr val="accent2"/>
+                </a:solidFill>
+              </a:rPr>
+              <a:t>0.99</a:t>
+            </a:r>
+            <a:endParaRPr kumimoji="1" lang="ja-JP" altLang="en-US" dirty="0">
+              <a:solidFill>
+                <a:schemeClr val="accent2"/>
+              </a:solidFill>
+            </a:endParaRPr>
+          </a:p>
+        </p:txBody>
+      </p:sp>
+      <p:cxnSp>
+        <p:nvCxnSpPr>
+          <p:cNvPr id="94" name="直線矢印コネクタ 93">
+            <a:extLst>
+              <a:ext uri="{FF2B5EF4-FFF2-40B4-BE49-F238E27FC236}">
+                <a16:creationId xmlns:a16="http://schemas.microsoft.com/office/drawing/2014/main" id="{987355B2-6921-FCB9-7CA2-A57EDB897E2E}"/>
+              </a:ext>
+            </a:extLst>
+          </p:cNvPr>
+          <p:cNvCxnSpPr>
+            <a:cxnSpLocks/>
+            <a:stCxn id="5" idx="5"/>
+            <a:endCxn id="32" idx="7"/>
+          </p:cNvCxnSpPr>
+          <p:nvPr/>
+        </p:nvCxnSpPr>
+        <p:spPr>
+          <a:xfrm>
+            <a:off x="6231347" y="3994804"/>
+            <a:ext cx="0" cy="1308635"/>
+          </a:xfrm>
+          <a:prstGeom prst="straightConnector1">
+            <a:avLst/>
+          </a:prstGeom>
+          <a:ln w="12700">
+            <a:solidFill>
+              <a:schemeClr val="accent2"/>
+            </a:solidFill>
+            <a:prstDash val="sysDash"/>
+            <a:tailEnd type="triangle"/>
+          </a:ln>
+        </p:spPr>
+        <p:style>
+          <a:lnRef idx="1">
+            <a:schemeClr val="accent1"/>
+          </a:lnRef>
+          <a:fillRef idx="0">
+            <a:schemeClr val="accent1"/>
+          </a:fillRef>
+          <a:effectRef idx="0">
+            <a:schemeClr val="accent1"/>
+          </a:effectRef>
+          <a:fontRef idx="minor">
+            <a:schemeClr val="tx1"/>
+          </a:fontRef>
+        </p:style>
+      </p:cxnSp>
+      <p:sp>
+        <p:nvSpPr>
+          <p:cNvPr id="100" name="テキスト ボックス 99">
+            <a:extLst>
+              <a:ext uri="{FF2B5EF4-FFF2-40B4-BE49-F238E27FC236}">
+                <a16:creationId xmlns:a16="http://schemas.microsoft.com/office/drawing/2014/main" id="{AAAE43CE-8368-F11C-7D3D-D04B7C8C972C}"/>
+              </a:ext>
+            </a:extLst>
+          </p:cNvPr>
+          <p:cNvSpPr txBox="1"/>
+          <p:nvPr/>
+        </p:nvSpPr>
+        <p:spPr>
+          <a:xfrm>
+            <a:off x="6250606" y="4454321"/>
+            <a:ext cx="746970" cy="369332"/>
+          </a:xfrm>
+          <a:prstGeom prst="rect">
+            <a:avLst/>
+          </a:prstGeom>
+          <a:noFill/>
+        </p:spPr>
+        <p:txBody>
+          <a:bodyPr wrap="square" rtlCol="0">
+            <a:spAutoFit/>
+          </a:bodyPr>
+          <a:lstStyle/>
+          <a:p>
+            <a:pPr algn="ctr"/>
+            <a:r>
+              <a:rPr lang="en-US" altLang="ja-JP" dirty="0">
+                <a:solidFill>
+                  <a:schemeClr val="accent2"/>
+                </a:solidFill>
+              </a:rPr>
+              <a:t>0.77</a:t>
+            </a:r>
+            <a:endParaRPr kumimoji="1" lang="ja-JP" altLang="en-US" dirty="0">
+              <a:solidFill>
+                <a:schemeClr val="accent2"/>
+              </a:solidFill>
+            </a:endParaRPr>
           </a:p>
         </p:txBody>
       </p:sp>
     </p:spTree>
     <p:extLst>
       <p:ext uri="{BB962C8B-B14F-4D97-AF65-F5344CB8AC3E}">
-        <p14:creationId xmlns:p14="http://schemas.microsoft.com/office/powerpoint/2010/main" val="1488004092"/>
+        <p14:creationId xmlns:p14="http://schemas.microsoft.com/office/powerpoint/2010/main" val="1673088100"/>
       </p:ext>
     </p:extLst>
   </p:cSld>
@@ -8026,6 +8430,1767 @@
           <a:p>
             <a:pPr algn="ctr"/>
             <a:r>
+              <a:rPr lang="en-US" altLang="ja-JP" dirty="0">
+                <a:solidFill>
+                  <a:schemeClr val="tx1"/>
+                </a:solidFill>
+              </a:rPr>
+              <a:t>3</a:t>
+            </a:r>
+            <a:endParaRPr kumimoji="1" lang="ja-JP" altLang="en-US" dirty="0">
+              <a:solidFill>
+                <a:schemeClr val="tx1"/>
+              </a:solidFill>
+            </a:endParaRPr>
+          </a:p>
+        </p:txBody>
+      </p:sp>
+      <p:cxnSp>
+        <p:nvCxnSpPr>
+          <p:cNvPr id="16" name="直線コネクタ 15">
+            <a:extLst>
+              <a:ext uri="{FF2B5EF4-FFF2-40B4-BE49-F238E27FC236}">
+                <a16:creationId xmlns:a16="http://schemas.microsoft.com/office/drawing/2014/main" id="{3A4231B4-3565-5623-E3D4-DFF863B012DB}"/>
+              </a:ext>
+            </a:extLst>
+          </p:cNvPr>
+          <p:cNvCxnSpPr>
+            <a:cxnSpLocks/>
+            <a:stCxn id="15" idx="6"/>
+            <a:endCxn id="5" idx="2"/>
+          </p:cNvCxnSpPr>
+          <p:nvPr/>
+        </p:nvCxnSpPr>
+        <p:spPr>
+          <a:xfrm>
+            <a:off x="7416248" y="3428999"/>
+            <a:ext cx="533040" cy="1"/>
+          </a:xfrm>
+          <a:prstGeom prst="line">
+            <a:avLst/>
+          </a:prstGeom>
+          <a:ln>
+            <a:solidFill>
+              <a:schemeClr val="tx1"/>
+            </a:solidFill>
+          </a:ln>
+        </p:spPr>
+        <p:style>
+          <a:lnRef idx="1">
+            <a:schemeClr val="accent1"/>
+          </a:lnRef>
+          <a:fillRef idx="0">
+            <a:schemeClr val="accent1"/>
+          </a:fillRef>
+          <a:effectRef idx="0">
+            <a:schemeClr val="accent1"/>
+          </a:effectRef>
+          <a:fontRef idx="minor">
+            <a:schemeClr val="tx1"/>
+          </a:fontRef>
+        </p:style>
+      </p:cxnSp>
+      <p:sp>
+        <p:nvSpPr>
+          <p:cNvPr id="19" name="楕円 18">
+            <a:extLst>
+              <a:ext uri="{FF2B5EF4-FFF2-40B4-BE49-F238E27FC236}">
+                <a16:creationId xmlns:a16="http://schemas.microsoft.com/office/drawing/2014/main" id="{F298F2AF-6D9A-4BE2-B86D-1BCB2DFA6915}"/>
+              </a:ext>
+            </a:extLst>
+          </p:cNvPr>
+          <p:cNvSpPr/>
+          <p:nvPr/>
+        </p:nvSpPr>
+        <p:spPr>
+          <a:xfrm>
+            <a:off x="6003265" y="2170221"/>
+            <a:ext cx="439971" cy="434763"/>
+          </a:xfrm>
+          <a:prstGeom prst="ellipse">
+            <a:avLst/>
+          </a:prstGeom>
+          <a:noFill/>
+          <a:ln>
+            <a:solidFill>
+              <a:schemeClr val="tx1"/>
+            </a:solidFill>
+          </a:ln>
+        </p:spPr>
+        <p:style>
+          <a:lnRef idx="2">
+            <a:schemeClr val="accent1">
+              <a:shade val="50000"/>
+            </a:schemeClr>
+          </a:lnRef>
+          <a:fillRef idx="1">
+            <a:schemeClr val="accent1"/>
+          </a:fillRef>
+          <a:effectRef idx="0">
+            <a:schemeClr val="accent1"/>
+          </a:effectRef>
+          <a:fontRef idx="minor">
+            <a:schemeClr val="lt1"/>
+          </a:fontRef>
+        </p:style>
+        <p:txBody>
+          <a:bodyPr rtlCol="0" anchor="ctr"/>
+          <a:lstStyle/>
+          <a:p>
+            <a:pPr algn="ctr"/>
+            <a:r>
+              <a:rPr lang="en-US" altLang="ja-JP" dirty="0">
+                <a:solidFill>
+                  <a:schemeClr val="tx1"/>
+                </a:solidFill>
+              </a:rPr>
+              <a:t>3</a:t>
+            </a:r>
+            <a:endParaRPr kumimoji="1" lang="ja-JP" altLang="en-US" dirty="0">
+              <a:solidFill>
+                <a:schemeClr val="tx1"/>
+              </a:solidFill>
+            </a:endParaRPr>
+          </a:p>
+        </p:txBody>
+      </p:sp>
+      <p:sp>
+        <p:nvSpPr>
+          <p:cNvPr id="20" name="楕円 19">
+            <a:extLst>
+              <a:ext uri="{FF2B5EF4-FFF2-40B4-BE49-F238E27FC236}">
+                <a16:creationId xmlns:a16="http://schemas.microsoft.com/office/drawing/2014/main" id="{98118023-75A8-13FF-B3AC-006BB2EB8EDC}"/>
+              </a:ext>
+            </a:extLst>
+          </p:cNvPr>
+          <p:cNvSpPr/>
+          <p:nvPr/>
+        </p:nvSpPr>
+        <p:spPr>
+          <a:xfrm>
+            <a:off x="6003264" y="4253017"/>
+            <a:ext cx="439971" cy="434763"/>
+          </a:xfrm>
+          <a:prstGeom prst="ellipse">
+            <a:avLst/>
+          </a:prstGeom>
+          <a:noFill/>
+          <a:ln>
+            <a:solidFill>
+              <a:schemeClr val="tx1"/>
+            </a:solidFill>
+          </a:ln>
+        </p:spPr>
+        <p:style>
+          <a:lnRef idx="2">
+            <a:schemeClr val="accent1">
+              <a:shade val="50000"/>
+            </a:schemeClr>
+          </a:lnRef>
+          <a:fillRef idx="1">
+            <a:schemeClr val="accent1"/>
+          </a:fillRef>
+          <a:effectRef idx="0">
+            <a:schemeClr val="accent1"/>
+          </a:effectRef>
+          <a:fontRef idx="minor">
+            <a:schemeClr val="lt1"/>
+          </a:fontRef>
+        </p:style>
+        <p:txBody>
+          <a:bodyPr rtlCol="0" anchor="ctr"/>
+          <a:lstStyle/>
+          <a:p>
+            <a:pPr algn="ctr"/>
+            <a:r>
+              <a:rPr kumimoji="1" lang="en-US" altLang="ja-JP" dirty="0">
+                <a:solidFill>
+                  <a:schemeClr val="tx1"/>
+                </a:solidFill>
+              </a:rPr>
+              <a:t>3</a:t>
+            </a:r>
+            <a:endParaRPr kumimoji="1" lang="ja-JP" altLang="en-US" dirty="0">
+              <a:solidFill>
+                <a:schemeClr val="tx1"/>
+              </a:solidFill>
+            </a:endParaRPr>
+          </a:p>
+        </p:txBody>
+      </p:sp>
+      <p:cxnSp>
+        <p:nvCxnSpPr>
+          <p:cNvPr id="21" name="直線コネクタ 20">
+            <a:extLst>
+              <a:ext uri="{FF2B5EF4-FFF2-40B4-BE49-F238E27FC236}">
+                <a16:creationId xmlns:a16="http://schemas.microsoft.com/office/drawing/2014/main" id="{5070F677-61C6-9C9B-5F79-303AFF26D89A}"/>
+              </a:ext>
+            </a:extLst>
+          </p:cNvPr>
+          <p:cNvCxnSpPr>
+            <a:cxnSpLocks/>
+            <a:stCxn id="19" idx="5"/>
+            <a:endCxn id="15" idx="1"/>
+          </p:cNvCxnSpPr>
+          <p:nvPr/>
+        </p:nvCxnSpPr>
+        <p:spPr>
+          <a:xfrm>
+            <a:off x="6378804" y="2541314"/>
+            <a:ext cx="661905" cy="733973"/>
+          </a:xfrm>
+          <a:prstGeom prst="line">
+            <a:avLst/>
+          </a:prstGeom>
+          <a:ln>
+            <a:solidFill>
+              <a:schemeClr val="tx1"/>
+            </a:solidFill>
+          </a:ln>
+        </p:spPr>
+        <p:style>
+          <a:lnRef idx="1">
+            <a:schemeClr val="accent1"/>
+          </a:lnRef>
+          <a:fillRef idx="0">
+            <a:schemeClr val="accent1"/>
+          </a:fillRef>
+          <a:effectRef idx="0">
+            <a:schemeClr val="accent1"/>
+          </a:effectRef>
+          <a:fontRef idx="minor">
+            <a:schemeClr val="tx1"/>
+          </a:fontRef>
+        </p:style>
+      </p:cxnSp>
+      <p:cxnSp>
+        <p:nvCxnSpPr>
+          <p:cNvPr id="24" name="直線コネクタ 23">
+            <a:extLst>
+              <a:ext uri="{FF2B5EF4-FFF2-40B4-BE49-F238E27FC236}">
+                <a16:creationId xmlns:a16="http://schemas.microsoft.com/office/drawing/2014/main" id="{F82A930C-F5AB-FBE4-A327-C027ABD864A4}"/>
+              </a:ext>
+            </a:extLst>
+          </p:cNvPr>
+          <p:cNvCxnSpPr>
+            <a:cxnSpLocks/>
+            <a:stCxn id="20" idx="7"/>
+            <a:endCxn id="15" idx="3"/>
+          </p:cNvCxnSpPr>
+          <p:nvPr/>
+        </p:nvCxnSpPr>
+        <p:spPr>
+          <a:xfrm flipV="1">
+            <a:off x="6378803" y="3582710"/>
+            <a:ext cx="661906" cy="733977"/>
+          </a:xfrm>
+          <a:prstGeom prst="line">
+            <a:avLst/>
+          </a:prstGeom>
+          <a:ln>
+            <a:solidFill>
+              <a:schemeClr val="tx1"/>
+            </a:solidFill>
+          </a:ln>
+        </p:spPr>
+        <p:style>
+          <a:lnRef idx="1">
+            <a:schemeClr val="accent1"/>
+          </a:lnRef>
+          <a:fillRef idx="0">
+            <a:schemeClr val="accent1"/>
+          </a:fillRef>
+          <a:effectRef idx="0">
+            <a:schemeClr val="accent1"/>
+          </a:effectRef>
+          <a:fontRef idx="minor">
+            <a:schemeClr val="tx1"/>
+          </a:fontRef>
+        </p:style>
+      </p:cxnSp>
+      <p:sp>
+        <p:nvSpPr>
+          <p:cNvPr id="29" name="楕円 28">
+            <a:extLst>
+              <a:ext uri="{FF2B5EF4-FFF2-40B4-BE49-F238E27FC236}">
+                <a16:creationId xmlns:a16="http://schemas.microsoft.com/office/drawing/2014/main" id="{1CD800FD-B353-1171-2988-83C6857DE156}"/>
+              </a:ext>
+            </a:extLst>
+          </p:cNvPr>
+          <p:cNvSpPr/>
+          <p:nvPr/>
+        </p:nvSpPr>
+        <p:spPr>
+          <a:xfrm>
+            <a:off x="5003576" y="2604984"/>
+            <a:ext cx="439971" cy="434763"/>
+          </a:xfrm>
+          <a:prstGeom prst="ellipse">
+            <a:avLst/>
+          </a:prstGeom>
+          <a:noFill/>
+          <a:ln>
+            <a:solidFill>
+              <a:schemeClr val="tx1"/>
+            </a:solidFill>
+          </a:ln>
+        </p:spPr>
+        <p:style>
+          <a:lnRef idx="2">
+            <a:schemeClr val="accent1">
+              <a:shade val="50000"/>
+            </a:schemeClr>
+          </a:lnRef>
+          <a:fillRef idx="1">
+            <a:schemeClr val="accent1"/>
+          </a:fillRef>
+          <a:effectRef idx="0">
+            <a:schemeClr val="accent1"/>
+          </a:effectRef>
+          <a:fontRef idx="minor">
+            <a:schemeClr val="lt1"/>
+          </a:fontRef>
+        </p:style>
+        <p:txBody>
+          <a:bodyPr rtlCol="0" anchor="ctr"/>
+          <a:lstStyle/>
+          <a:p>
+            <a:pPr algn="ctr"/>
+            <a:r>
+              <a:rPr kumimoji="1" lang="en-US" altLang="ja-JP" dirty="0">
+                <a:solidFill>
+                  <a:schemeClr val="tx1"/>
+                </a:solidFill>
+              </a:rPr>
+              <a:t>3</a:t>
+            </a:r>
+            <a:endParaRPr kumimoji="1" lang="ja-JP" altLang="en-US" dirty="0">
+              <a:solidFill>
+                <a:schemeClr val="tx1"/>
+              </a:solidFill>
+            </a:endParaRPr>
+          </a:p>
+        </p:txBody>
+      </p:sp>
+      <p:sp>
+        <p:nvSpPr>
+          <p:cNvPr id="33" name="楕円 32">
+            <a:extLst>
+              <a:ext uri="{FF2B5EF4-FFF2-40B4-BE49-F238E27FC236}">
+                <a16:creationId xmlns:a16="http://schemas.microsoft.com/office/drawing/2014/main" id="{81EAF303-AF4F-6280-C2E6-44197D523A05}"/>
+              </a:ext>
+            </a:extLst>
+          </p:cNvPr>
+          <p:cNvSpPr/>
+          <p:nvPr/>
+        </p:nvSpPr>
+        <p:spPr>
+          <a:xfrm>
+            <a:off x="5019342" y="1738766"/>
+            <a:ext cx="439971" cy="434763"/>
+          </a:xfrm>
+          <a:prstGeom prst="ellipse">
+            <a:avLst/>
+          </a:prstGeom>
+          <a:noFill/>
+          <a:ln>
+            <a:solidFill>
+              <a:schemeClr val="tx1"/>
+            </a:solidFill>
+          </a:ln>
+        </p:spPr>
+        <p:style>
+          <a:lnRef idx="2">
+            <a:schemeClr val="accent1">
+              <a:shade val="50000"/>
+            </a:schemeClr>
+          </a:lnRef>
+          <a:fillRef idx="1">
+            <a:schemeClr val="accent1"/>
+          </a:fillRef>
+          <a:effectRef idx="0">
+            <a:schemeClr val="accent1"/>
+          </a:effectRef>
+          <a:fontRef idx="minor">
+            <a:schemeClr val="lt1"/>
+          </a:fontRef>
+        </p:style>
+        <p:txBody>
+          <a:bodyPr rtlCol="0" anchor="ctr"/>
+          <a:lstStyle/>
+          <a:p>
+            <a:pPr algn="ctr"/>
+            <a:r>
+              <a:rPr kumimoji="1" lang="en-US" altLang="ja-JP" dirty="0">
+                <a:solidFill>
+                  <a:schemeClr val="tx1"/>
+                </a:solidFill>
+              </a:rPr>
+              <a:t>3</a:t>
+            </a:r>
+            <a:endParaRPr kumimoji="1" lang="ja-JP" altLang="en-US" dirty="0">
+              <a:solidFill>
+                <a:schemeClr val="tx1"/>
+              </a:solidFill>
+            </a:endParaRPr>
+          </a:p>
+        </p:txBody>
+      </p:sp>
+      <p:cxnSp>
+        <p:nvCxnSpPr>
+          <p:cNvPr id="35" name="直線コネクタ 34">
+            <a:extLst>
+              <a:ext uri="{FF2B5EF4-FFF2-40B4-BE49-F238E27FC236}">
+                <a16:creationId xmlns:a16="http://schemas.microsoft.com/office/drawing/2014/main" id="{3394F000-E77A-B6D4-022D-10AACDA928FB}"/>
+              </a:ext>
+            </a:extLst>
+          </p:cNvPr>
+          <p:cNvCxnSpPr>
+            <a:cxnSpLocks/>
+            <a:stCxn id="33" idx="6"/>
+            <a:endCxn id="19" idx="1"/>
+          </p:cNvCxnSpPr>
+          <p:nvPr/>
+        </p:nvCxnSpPr>
+        <p:spPr>
+          <a:xfrm>
+            <a:off x="5459313" y="1956148"/>
+            <a:ext cx="608384" cy="277743"/>
+          </a:xfrm>
+          <a:prstGeom prst="line">
+            <a:avLst/>
+          </a:prstGeom>
+          <a:ln>
+            <a:solidFill>
+              <a:schemeClr val="tx1"/>
+            </a:solidFill>
+          </a:ln>
+        </p:spPr>
+        <p:style>
+          <a:lnRef idx="1">
+            <a:schemeClr val="accent1"/>
+          </a:lnRef>
+          <a:fillRef idx="0">
+            <a:schemeClr val="accent1"/>
+          </a:fillRef>
+          <a:effectRef idx="0">
+            <a:schemeClr val="accent1"/>
+          </a:effectRef>
+          <a:fontRef idx="minor">
+            <a:schemeClr val="tx1"/>
+          </a:fontRef>
+        </p:style>
+      </p:cxnSp>
+      <p:cxnSp>
+        <p:nvCxnSpPr>
+          <p:cNvPr id="48" name="直線コネクタ 47">
+            <a:extLst>
+              <a:ext uri="{FF2B5EF4-FFF2-40B4-BE49-F238E27FC236}">
+                <a16:creationId xmlns:a16="http://schemas.microsoft.com/office/drawing/2014/main" id="{38153412-84F5-4E64-1F56-01EEB3020D40}"/>
+              </a:ext>
+            </a:extLst>
+          </p:cNvPr>
+          <p:cNvCxnSpPr>
+            <a:cxnSpLocks/>
+            <a:stCxn id="29" idx="6"/>
+            <a:endCxn id="19" idx="3"/>
+          </p:cNvCxnSpPr>
+          <p:nvPr/>
+        </p:nvCxnSpPr>
+        <p:spPr>
+          <a:xfrm flipV="1">
+            <a:off x="5443547" y="2541314"/>
+            <a:ext cx="624150" cy="281052"/>
+          </a:xfrm>
+          <a:prstGeom prst="line">
+            <a:avLst/>
+          </a:prstGeom>
+          <a:ln>
+            <a:solidFill>
+              <a:schemeClr val="tx1"/>
+            </a:solidFill>
+          </a:ln>
+        </p:spPr>
+        <p:style>
+          <a:lnRef idx="1">
+            <a:schemeClr val="accent1"/>
+          </a:lnRef>
+          <a:fillRef idx="0">
+            <a:schemeClr val="accent1"/>
+          </a:fillRef>
+          <a:effectRef idx="0">
+            <a:schemeClr val="accent1"/>
+          </a:effectRef>
+          <a:fontRef idx="minor">
+            <a:schemeClr val="tx1"/>
+          </a:fontRef>
+        </p:style>
+      </p:cxnSp>
+      <p:sp>
+        <p:nvSpPr>
+          <p:cNvPr id="51" name="楕円 50">
+            <a:extLst>
+              <a:ext uri="{FF2B5EF4-FFF2-40B4-BE49-F238E27FC236}">
+                <a16:creationId xmlns:a16="http://schemas.microsoft.com/office/drawing/2014/main" id="{936398A2-1B1A-ADAB-C692-B1CDC54323CD}"/>
+              </a:ext>
+            </a:extLst>
+          </p:cNvPr>
+          <p:cNvSpPr/>
+          <p:nvPr/>
+        </p:nvSpPr>
+        <p:spPr>
+          <a:xfrm>
+            <a:off x="5035416" y="4253015"/>
+            <a:ext cx="439971" cy="434763"/>
+          </a:xfrm>
+          <a:prstGeom prst="ellipse">
+            <a:avLst/>
+          </a:prstGeom>
+          <a:noFill/>
+          <a:ln>
+            <a:solidFill>
+              <a:schemeClr val="tx1"/>
+            </a:solidFill>
+          </a:ln>
+        </p:spPr>
+        <p:style>
+          <a:lnRef idx="2">
+            <a:schemeClr val="accent1">
+              <a:shade val="50000"/>
+            </a:schemeClr>
+          </a:lnRef>
+          <a:fillRef idx="1">
+            <a:schemeClr val="accent1"/>
+          </a:fillRef>
+          <a:effectRef idx="0">
+            <a:schemeClr val="accent1"/>
+          </a:effectRef>
+          <a:fontRef idx="minor">
+            <a:schemeClr val="lt1"/>
+          </a:fontRef>
+        </p:style>
+        <p:txBody>
+          <a:bodyPr rtlCol="0" anchor="ctr"/>
+          <a:lstStyle/>
+          <a:p>
+            <a:pPr algn="ctr"/>
+            <a:r>
+              <a:rPr kumimoji="1" lang="en-US" altLang="ja-JP" dirty="0">
+                <a:solidFill>
+                  <a:schemeClr val="tx1"/>
+                </a:solidFill>
+              </a:rPr>
+              <a:t>3</a:t>
+            </a:r>
+            <a:endParaRPr kumimoji="1" lang="ja-JP" altLang="en-US" dirty="0">
+              <a:solidFill>
+                <a:schemeClr val="tx1"/>
+              </a:solidFill>
+            </a:endParaRPr>
+          </a:p>
+        </p:txBody>
+      </p:sp>
+      <p:cxnSp>
+        <p:nvCxnSpPr>
+          <p:cNvPr id="66" name="直線コネクタ 65">
+            <a:extLst>
+              <a:ext uri="{FF2B5EF4-FFF2-40B4-BE49-F238E27FC236}">
+                <a16:creationId xmlns:a16="http://schemas.microsoft.com/office/drawing/2014/main" id="{0D73DC1B-4788-4BEA-BCD5-5A95101381AA}"/>
+              </a:ext>
+            </a:extLst>
+          </p:cNvPr>
+          <p:cNvCxnSpPr>
+            <a:cxnSpLocks/>
+            <a:stCxn id="68" idx="6"/>
+            <a:endCxn id="33" idx="2"/>
+          </p:cNvCxnSpPr>
+          <p:nvPr/>
+        </p:nvCxnSpPr>
+        <p:spPr>
+          <a:xfrm>
+            <a:off x="4462860" y="1956148"/>
+            <a:ext cx="556482" cy="0"/>
+          </a:xfrm>
+          <a:prstGeom prst="line">
+            <a:avLst/>
+          </a:prstGeom>
+          <a:ln>
+            <a:solidFill>
+              <a:schemeClr val="tx1"/>
+            </a:solidFill>
+          </a:ln>
+        </p:spPr>
+        <p:style>
+          <a:lnRef idx="1">
+            <a:schemeClr val="accent1"/>
+          </a:lnRef>
+          <a:fillRef idx="0">
+            <a:schemeClr val="accent1"/>
+          </a:fillRef>
+          <a:effectRef idx="0">
+            <a:schemeClr val="accent1"/>
+          </a:effectRef>
+          <a:fontRef idx="minor">
+            <a:schemeClr val="tx1"/>
+          </a:fontRef>
+        </p:style>
+      </p:cxnSp>
+      <p:sp>
+        <p:nvSpPr>
+          <p:cNvPr id="68" name="楕円 67">
+            <a:extLst>
+              <a:ext uri="{FF2B5EF4-FFF2-40B4-BE49-F238E27FC236}">
+                <a16:creationId xmlns:a16="http://schemas.microsoft.com/office/drawing/2014/main" id="{78219453-3070-8E5F-6244-96693EC9F5A2}"/>
+              </a:ext>
+            </a:extLst>
+          </p:cNvPr>
+          <p:cNvSpPr/>
+          <p:nvPr/>
+        </p:nvSpPr>
+        <p:spPr>
+          <a:xfrm>
+            <a:off x="4022889" y="1738766"/>
+            <a:ext cx="439971" cy="434763"/>
+          </a:xfrm>
+          <a:prstGeom prst="ellipse">
+            <a:avLst/>
+          </a:prstGeom>
+          <a:noFill/>
+          <a:ln>
+            <a:solidFill>
+              <a:schemeClr val="tx1"/>
+            </a:solidFill>
+          </a:ln>
+        </p:spPr>
+        <p:style>
+          <a:lnRef idx="2">
+            <a:schemeClr val="accent1">
+              <a:shade val="50000"/>
+            </a:schemeClr>
+          </a:lnRef>
+          <a:fillRef idx="1">
+            <a:schemeClr val="accent1"/>
+          </a:fillRef>
+          <a:effectRef idx="0">
+            <a:schemeClr val="accent1"/>
+          </a:effectRef>
+          <a:fontRef idx="minor">
+            <a:schemeClr val="lt1"/>
+          </a:fontRef>
+        </p:style>
+        <p:txBody>
+          <a:bodyPr rtlCol="0" anchor="ctr"/>
+          <a:lstStyle/>
+          <a:p>
+            <a:pPr algn="ctr"/>
+            <a:r>
+              <a:rPr kumimoji="1" lang="en-US" altLang="ja-JP" dirty="0">
+                <a:solidFill>
+                  <a:schemeClr val="tx1"/>
+                </a:solidFill>
+              </a:rPr>
+              <a:t>3</a:t>
+            </a:r>
+            <a:endParaRPr kumimoji="1" lang="ja-JP" altLang="en-US" dirty="0">
+              <a:solidFill>
+                <a:schemeClr val="tx1"/>
+              </a:solidFill>
+            </a:endParaRPr>
+          </a:p>
+        </p:txBody>
+      </p:sp>
+      <p:cxnSp>
+        <p:nvCxnSpPr>
+          <p:cNvPr id="89" name="直線コネクタ 88">
+            <a:extLst>
+              <a:ext uri="{FF2B5EF4-FFF2-40B4-BE49-F238E27FC236}">
+                <a16:creationId xmlns:a16="http://schemas.microsoft.com/office/drawing/2014/main" id="{219E3501-C614-A6C3-7C21-28CF0F8C4DF5}"/>
+              </a:ext>
+            </a:extLst>
+          </p:cNvPr>
+          <p:cNvCxnSpPr>
+            <a:cxnSpLocks/>
+            <a:stCxn id="90" idx="6"/>
+            <a:endCxn id="68" idx="2"/>
+          </p:cNvCxnSpPr>
+          <p:nvPr/>
+        </p:nvCxnSpPr>
+        <p:spPr>
+          <a:xfrm>
+            <a:off x="3466407" y="1956148"/>
+            <a:ext cx="556482" cy="0"/>
+          </a:xfrm>
+          <a:prstGeom prst="line">
+            <a:avLst/>
+          </a:prstGeom>
+          <a:ln>
+            <a:solidFill>
+              <a:schemeClr val="tx1"/>
+            </a:solidFill>
+          </a:ln>
+        </p:spPr>
+        <p:style>
+          <a:lnRef idx="1">
+            <a:schemeClr val="accent1"/>
+          </a:lnRef>
+          <a:fillRef idx="0">
+            <a:schemeClr val="accent1"/>
+          </a:fillRef>
+          <a:effectRef idx="0">
+            <a:schemeClr val="accent1"/>
+          </a:effectRef>
+          <a:fontRef idx="minor">
+            <a:schemeClr val="tx1"/>
+          </a:fontRef>
+        </p:style>
+      </p:cxnSp>
+      <p:sp>
+        <p:nvSpPr>
+          <p:cNvPr id="90" name="楕円 89">
+            <a:extLst>
+              <a:ext uri="{FF2B5EF4-FFF2-40B4-BE49-F238E27FC236}">
+                <a16:creationId xmlns:a16="http://schemas.microsoft.com/office/drawing/2014/main" id="{2185B69C-2469-826A-A26E-3F85300008CD}"/>
+              </a:ext>
+            </a:extLst>
+          </p:cNvPr>
+          <p:cNvSpPr/>
+          <p:nvPr/>
+        </p:nvSpPr>
+        <p:spPr>
+          <a:xfrm>
+            <a:off x="3026436" y="1738766"/>
+            <a:ext cx="439971" cy="434763"/>
+          </a:xfrm>
+          <a:prstGeom prst="ellipse">
+            <a:avLst/>
+          </a:prstGeom>
+          <a:noFill/>
+          <a:ln>
+            <a:solidFill>
+              <a:schemeClr val="tx1"/>
+            </a:solidFill>
+          </a:ln>
+        </p:spPr>
+        <p:style>
+          <a:lnRef idx="2">
+            <a:schemeClr val="accent1">
+              <a:shade val="50000"/>
+            </a:schemeClr>
+          </a:lnRef>
+          <a:fillRef idx="1">
+            <a:schemeClr val="accent1"/>
+          </a:fillRef>
+          <a:effectRef idx="0">
+            <a:schemeClr val="accent1"/>
+          </a:effectRef>
+          <a:fontRef idx="minor">
+            <a:schemeClr val="lt1"/>
+          </a:fontRef>
+        </p:style>
+        <p:txBody>
+          <a:bodyPr rtlCol="0" anchor="ctr"/>
+          <a:lstStyle/>
+          <a:p>
+            <a:pPr algn="ctr"/>
+            <a:r>
+              <a:rPr kumimoji="1" lang="en-US" altLang="ja-JP" dirty="0">
+                <a:solidFill>
+                  <a:schemeClr val="tx1"/>
+                </a:solidFill>
+              </a:rPr>
+              <a:t>3</a:t>
+            </a:r>
+            <a:endParaRPr kumimoji="1" lang="ja-JP" altLang="en-US" dirty="0">
+              <a:solidFill>
+                <a:schemeClr val="tx1"/>
+              </a:solidFill>
+            </a:endParaRPr>
+          </a:p>
+        </p:txBody>
+      </p:sp>
+      <p:cxnSp>
+        <p:nvCxnSpPr>
+          <p:cNvPr id="92" name="直線コネクタ 91">
+            <a:extLst>
+              <a:ext uri="{FF2B5EF4-FFF2-40B4-BE49-F238E27FC236}">
+                <a16:creationId xmlns:a16="http://schemas.microsoft.com/office/drawing/2014/main" id="{F0188C79-281A-7EB4-B7A7-0B74E0A01B6C}"/>
+              </a:ext>
+            </a:extLst>
+          </p:cNvPr>
+          <p:cNvCxnSpPr>
+            <a:cxnSpLocks/>
+            <a:stCxn id="93" idx="6"/>
+            <a:endCxn id="29" idx="2"/>
+          </p:cNvCxnSpPr>
+          <p:nvPr/>
+        </p:nvCxnSpPr>
+        <p:spPr>
+          <a:xfrm>
+            <a:off x="4462860" y="2822366"/>
+            <a:ext cx="540716" cy="0"/>
+          </a:xfrm>
+          <a:prstGeom prst="line">
+            <a:avLst/>
+          </a:prstGeom>
+          <a:ln>
+            <a:solidFill>
+              <a:schemeClr val="tx1"/>
+            </a:solidFill>
+          </a:ln>
+        </p:spPr>
+        <p:style>
+          <a:lnRef idx="1">
+            <a:schemeClr val="accent1"/>
+          </a:lnRef>
+          <a:fillRef idx="0">
+            <a:schemeClr val="accent1"/>
+          </a:fillRef>
+          <a:effectRef idx="0">
+            <a:schemeClr val="accent1"/>
+          </a:effectRef>
+          <a:fontRef idx="minor">
+            <a:schemeClr val="tx1"/>
+          </a:fontRef>
+        </p:style>
+      </p:cxnSp>
+      <p:sp>
+        <p:nvSpPr>
+          <p:cNvPr id="93" name="楕円 92">
+            <a:extLst>
+              <a:ext uri="{FF2B5EF4-FFF2-40B4-BE49-F238E27FC236}">
+                <a16:creationId xmlns:a16="http://schemas.microsoft.com/office/drawing/2014/main" id="{72B03E98-54FC-6EE9-49BB-063EFC599DCE}"/>
+              </a:ext>
+            </a:extLst>
+          </p:cNvPr>
+          <p:cNvSpPr/>
+          <p:nvPr/>
+        </p:nvSpPr>
+        <p:spPr>
+          <a:xfrm>
+            <a:off x="4022889" y="2604984"/>
+            <a:ext cx="439971" cy="434763"/>
+          </a:xfrm>
+          <a:prstGeom prst="ellipse">
+            <a:avLst/>
+          </a:prstGeom>
+          <a:noFill/>
+          <a:ln>
+            <a:solidFill>
+              <a:schemeClr val="tx1"/>
+            </a:solidFill>
+          </a:ln>
+        </p:spPr>
+        <p:style>
+          <a:lnRef idx="2">
+            <a:schemeClr val="accent1">
+              <a:shade val="50000"/>
+            </a:schemeClr>
+          </a:lnRef>
+          <a:fillRef idx="1">
+            <a:schemeClr val="accent1"/>
+          </a:fillRef>
+          <a:effectRef idx="0">
+            <a:schemeClr val="accent1"/>
+          </a:effectRef>
+          <a:fontRef idx="minor">
+            <a:schemeClr val="lt1"/>
+          </a:fontRef>
+        </p:style>
+        <p:txBody>
+          <a:bodyPr rtlCol="0" anchor="ctr"/>
+          <a:lstStyle/>
+          <a:p>
+            <a:pPr algn="ctr"/>
+            <a:r>
+              <a:rPr kumimoji="1" lang="en-US" altLang="ja-JP" dirty="0">
+                <a:solidFill>
+                  <a:schemeClr val="tx1"/>
+                </a:solidFill>
+              </a:rPr>
+              <a:t>3</a:t>
+            </a:r>
+            <a:endParaRPr kumimoji="1" lang="ja-JP" altLang="en-US" dirty="0">
+              <a:solidFill>
+                <a:schemeClr val="tx1"/>
+              </a:solidFill>
+            </a:endParaRPr>
+          </a:p>
+        </p:txBody>
+      </p:sp>
+      <p:cxnSp>
+        <p:nvCxnSpPr>
+          <p:cNvPr id="94" name="直線コネクタ 93">
+            <a:extLst>
+              <a:ext uri="{FF2B5EF4-FFF2-40B4-BE49-F238E27FC236}">
+                <a16:creationId xmlns:a16="http://schemas.microsoft.com/office/drawing/2014/main" id="{2A3434F9-101A-C370-87D9-B8A615A1B98C}"/>
+              </a:ext>
+            </a:extLst>
+          </p:cNvPr>
+          <p:cNvCxnSpPr>
+            <a:cxnSpLocks/>
+            <a:stCxn id="95" idx="6"/>
+            <a:endCxn id="93" idx="2"/>
+          </p:cNvCxnSpPr>
+          <p:nvPr/>
+        </p:nvCxnSpPr>
+        <p:spPr>
+          <a:xfrm>
+            <a:off x="3467843" y="2822366"/>
+            <a:ext cx="555046" cy="0"/>
+          </a:xfrm>
+          <a:prstGeom prst="line">
+            <a:avLst/>
+          </a:prstGeom>
+          <a:ln>
+            <a:solidFill>
+              <a:schemeClr val="tx1"/>
+            </a:solidFill>
+          </a:ln>
+        </p:spPr>
+        <p:style>
+          <a:lnRef idx="1">
+            <a:schemeClr val="accent1"/>
+          </a:lnRef>
+          <a:fillRef idx="0">
+            <a:schemeClr val="accent1"/>
+          </a:fillRef>
+          <a:effectRef idx="0">
+            <a:schemeClr val="accent1"/>
+          </a:effectRef>
+          <a:fontRef idx="minor">
+            <a:schemeClr val="tx1"/>
+          </a:fontRef>
+        </p:style>
+      </p:cxnSp>
+      <p:sp>
+        <p:nvSpPr>
+          <p:cNvPr id="95" name="楕円 94">
+            <a:extLst>
+              <a:ext uri="{FF2B5EF4-FFF2-40B4-BE49-F238E27FC236}">
+                <a16:creationId xmlns:a16="http://schemas.microsoft.com/office/drawing/2014/main" id="{9BADADBC-278B-8A91-3D80-907EC7D90CD2}"/>
+              </a:ext>
+            </a:extLst>
+          </p:cNvPr>
+          <p:cNvSpPr/>
+          <p:nvPr/>
+        </p:nvSpPr>
+        <p:spPr>
+          <a:xfrm>
+            <a:off x="3027872" y="2604984"/>
+            <a:ext cx="439971" cy="434763"/>
+          </a:xfrm>
+          <a:prstGeom prst="ellipse">
+            <a:avLst/>
+          </a:prstGeom>
+          <a:noFill/>
+          <a:ln>
+            <a:solidFill>
+              <a:schemeClr val="tx1"/>
+            </a:solidFill>
+          </a:ln>
+        </p:spPr>
+        <p:style>
+          <a:lnRef idx="2">
+            <a:schemeClr val="accent1">
+              <a:shade val="50000"/>
+            </a:schemeClr>
+          </a:lnRef>
+          <a:fillRef idx="1">
+            <a:schemeClr val="accent1"/>
+          </a:fillRef>
+          <a:effectRef idx="0">
+            <a:schemeClr val="accent1"/>
+          </a:effectRef>
+          <a:fontRef idx="minor">
+            <a:schemeClr val="lt1"/>
+          </a:fontRef>
+        </p:style>
+        <p:txBody>
+          <a:bodyPr rtlCol="0" anchor="ctr"/>
+          <a:lstStyle/>
+          <a:p>
+            <a:pPr algn="ctr"/>
+            <a:r>
+              <a:rPr lang="en-US" altLang="ja-JP" dirty="0">
+                <a:solidFill>
+                  <a:schemeClr val="tx1"/>
+                </a:solidFill>
+              </a:rPr>
+              <a:t>0</a:t>
+            </a:r>
+            <a:endParaRPr kumimoji="1" lang="ja-JP" altLang="en-US" dirty="0">
+              <a:solidFill>
+                <a:schemeClr val="tx1"/>
+              </a:solidFill>
+            </a:endParaRPr>
+          </a:p>
+        </p:txBody>
+      </p:sp>
+      <p:cxnSp>
+        <p:nvCxnSpPr>
+          <p:cNvPr id="101" name="直線コネクタ 100">
+            <a:extLst>
+              <a:ext uri="{FF2B5EF4-FFF2-40B4-BE49-F238E27FC236}">
+                <a16:creationId xmlns:a16="http://schemas.microsoft.com/office/drawing/2014/main" id="{662F5556-2EA0-97A9-8869-4603EFD5B92B}"/>
+              </a:ext>
+            </a:extLst>
+          </p:cNvPr>
+          <p:cNvCxnSpPr>
+            <a:cxnSpLocks/>
+            <a:stCxn id="102" idx="6"/>
+            <a:endCxn id="51" idx="2"/>
+          </p:cNvCxnSpPr>
+          <p:nvPr/>
+        </p:nvCxnSpPr>
+        <p:spPr>
+          <a:xfrm>
+            <a:off x="4478935" y="4470397"/>
+            <a:ext cx="556481" cy="0"/>
+          </a:xfrm>
+          <a:prstGeom prst="line">
+            <a:avLst/>
+          </a:prstGeom>
+          <a:ln>
+            <a:solidFill>
+              <a:schemeClr val="tx1"/>
+            </a:solidFill>
+          </a:ln>
+        </p:spPr>
+        <p:style>
+          <a:lnRef idx="1">
+            <a:schemeClr val="accent1"/>
+          </a:lnRef>
+          <a:fillRef idx="0">
+            <a:schemeClr val="accent1"/>
+          </a:fillRef>
+          <a:effectRef idx="0">
+            <a:schemeClr val="accent1"/>
+          </a:effectRef>
+          <a:fontRef idx="minor">
+            <a:schemeClr val="tx1"/>
+          </a:fontRef>
+        </p:style>
+      </p:cxnSp>
+      <p:sp>
+        <p:nvSpPr>
+          <p:cNvPr id="102" name="楕円 101">
+            <a:extLst>
+              <a:ext uri="{FF2B5EF4-FFF2-40B4-BE49-F238E27FC236}">
+                <a16:creationId xmlns:a16="http://schemas.microsoft.com/office/drawing/2014/main" id="{5109BDEE-2DC4-30E4-B752-3C1E79E02695}"/>
+              </a:ext>
+            </a:extLst>
+          </p:cNvPr>
+          <p:cNvSpPr/>
+          <p:nvPr/>
+        </p:nvSpPr>
+        <p:spPr>
+          <a:xfrm>
+            <a:off x="4038964" y="4253015"/>
+            <a:ext cx="439971" cy="434763"/>
+          </a:xfrm>
+          <a:prstGeom prst="ellipse">
+            <a:avLst/>
+          </a:prstGeom>
+          <a:noFill/>
+          <a:ln>
+            <a:solidFill>
+              <a:schemeClr val="tx1"/>
+            </a:solidFill>
+          </a:ln>
+        </p:spPr>
+        <p:style>
+          <a:lnRef idx="2">
+            <a:schemeClr val="accent1">
+              <a:shade val="50000"/>
+            </a:schemeClr>
+          </a:lnRef>
+          <a:fillRef idx="1">
+            <a:schemeClr val="accent1"/>
+          </a:fillRef>
+          <a:effectRef idx="0">
+            <a:schemeClr val="accent1"/>
+          </a:effectRef>
+          <a:fontRef idx="minor">
+            <a:schemeClr val="lt1"/>
+          </a:fontRef>
+        </p:style>
+        <p:txBody>
+          <a:bodyPr rtlCol="0" anchor="ctr"/>
+          <a:lstStyle/>
+          <a:p>
+            <a:pPr algn="ctr"/>
+            <a:r>
+              <a:rPr kumimoji="1" lang="en-US" altLang="ja-JP" dirty="0">
+                <a:solidFill>
+                  <a:schemeClr val="tx1"/>
+                </a:solidFill>
+              </a:rPr>
+              <a:t>3</a:t>
+            </a:r>
+            <a:endParaRPr kumimoji="1" lang="ja-JP" altLang="en-US" dirty="0">
+              <a:solidFill>
+                <a:schemeClr val="tx1"/>
+              </a:solidFill>
+            </a:endParaRPr>
+          </a:p>
+        </p:txBody>
+      </p:sp>
+      <p:cxnSp>
+        <p:nvCxnSpPr>
+          <p:cNvPr id="103" name="直線コネクタ 102">
+            <a:extLst>
+              <a:ext uri="{FF2B5EF4-FFF2-40B4-BE49-F238E27FC236}">
+                <a16:creationId xmlns:a16="http://schemas.microsoft.com/office/drawing/2014/main" id="{69C44B0D-BF3C-6EB1-41C9-F231BD414390}"/>
+              </a:ext>
+            </a:extLst>
+          </p:cNvPr>
+          <p:cNvCxnSpPr>
+            <a:cxnSpLocks/>
+            <a:stCxn id="104" idx="6"/>
+            <a:endCxn id="102" idx="2"/>
+          </p:cNvCxnSpPr>
+          <p:nvPr/>
+        </p:nvCxnSpPr>
+        <p:spPr>
+          <a:xfrm>
+            <a:off x="3482482" y="4470397"/>
+            <a:ext cx="556482" cy="0"/>
+          </a:xfrm>
+          <a:prstGeom prst="line">
+            <a:avLst/>
+          </a:prstGeom>
+          <a:ln>
+            <a:solidFill>
+              <a:schemeClr val="tx1"/>
+            </a:solidFill>
+          </a:ln>
+        </p:spPr>
+        <p:style>
+          <a:lnRef idx="1">
+            <a:schemeClr val="accent1"/>
+          </a:lnRef>
+          <a:fillRef idx="0">
+            <a:schemeClr val="accent1"/>
+          </a:fillRef>
+          <a:effectRef idx="0">
+            <a:schemeClr val="accent1"/>
+          </a:effectRef>
+          <a:fontRef idx="minor">
+            <a:schemeClr val="tx1"/>
+          </a:fontRef>
+        </p:style>
+      </p:cxnSp>
+      <p:sp>
+        <p:nvSpPr>
+          <p:cNvPr id="104" name="楕円 103">
+            <a:extLst>
+              <a:ext uri="{FF2B5EF4-FFF2-40B4-BE49-F238E27FC236}">
+                <a16:creationId xmlns:a16="http://schemas.microsoft.com/office/drawing/2014/main" id="{7CC5E67B-17EA-0E0D-DC4D-17F23BA87DB7}"/>
+              </a:ext>
+            </a:extLst>
+          </p:cNvPr>
+          <p:cNvSpPr/>
+          <p:nvPr/>
+        </p:nvSpPr>
+        <p:spPr>
+          <a:xfrm>
+            <a:off x="3042511" y="4253015"/>
+            <a:ext cx="439971" cy="434763"/>
+          </a:xfrm>
+          <a:prstGeom prst="ellipse">
+            <a:avLst/>
+          </a:prstGeom>
+          <a:noFill/>
+          <a:ln>
+            <a:solidFill>
+              <a:schemeClr val="tx1"/>
+            </a:solidFill>
+          </a:ln>
+        </p:spPr>
+        <p:style>
+          <a:lnRef idx="2">
+            <a:schemeClr val="accent1">
+              <a:shade val="50000"/>
+            </a:schemeClr>
+          </a:lnRef>
+          <a:fillRef idx="1">
+            <a:schemeClr val="accent1"/>
+          </a:fillRef>
+          <a:effectRef idx="0">
+            <a:schemeClr val="accent1"/>
+          </a:effectRef>
+          <a:fontRef idx="minor">
+            <a:schemeClr val="lt1"/>
+          </a:fontRef>
+        </p:style>
+        <p:txBody>
+          <a:bodyPr rtlCol="0" anchor="ctr"/>
+          <a:lstStyle/>
+          <a:p>
+            <a:pPr algn="ctr"/>
+            <a:r>
+              <a:rPr lang="en-US" altLang="ja-JP" dirty="0">
+                <a:solidFill>
+                  <a:schemeClr val="tx1"/>
+                </a:solidFill>
+              </a:rPr>
+              <a:t>0</a:t>
+            </a:r>
+            <a:endParaRPr kumimoji="1" lang="ja-JP" altLang="en-US" dirty="0">
+              <a:solidFill>
+                <a:schemeClr val="tx1"/>
+              </a:solidFill>
+            </a:endParaRPr>
+          </a:p>
+        </p:txBody>
+      </p:sp>
+      <p:cxnSp>
+        <p:nvCxnSpPr>
+          <p:cNvPr id="3" name="直線コネクタ 2">
+            <a:extLst>
+              <a:ext uri="{FF2B5EF4-FFF2-40B4-BE49-F238E27FC236}">
+                <a16:creationId xmlns:a16="http://schemas.microsoft.com/office/drawing/2014/main" id="{77AFF6F8-9CA7-9910-00AE-6EAC8F2AB456}"/>
+              </a:ext>
+            </a:extLst>
+          </p:cNvPr>
+          <p:cNvCxnSpPr>
+            <a:cxnSpLocks/>
+            <a:stCxn id="6" idx="6"/>
+            <a:endCxn id="90" idx="2"/>
+          </p:cNvCxnSpPr>
+          <p:nvPr/>
+        </p:nvCxnSpPr>
+        <p:spPr>
+          <a:xfrm>
+            <a:off x="2469954" y="1956148"/>
+            <a:ext cx="556482" cy="0"/>
+          </a:xfrm>
+          <a:prstGeom prst="line">
+            <a:avLst/>
+          </a:prstGeom>
+          <a:ln>
+            <a:solidFill>
+              <a:schemeClr val="tx1"/>
+            </a:solidFill>
+          </a:ln>
+        </p:spPr>
+        <p:style>
+          <a:lnRef idx="1">
+            <a:schemeClr val="accent1"/>
+          </a:lnRef>
+          <a:fillRef idx="0">
+            <a:schemeClr val="accent1"/>
+          </a:fillRef>
+          <a:effectRef idx="0">
+            <a:schemeClr val="accent1"/>
+          </a:effectRef>
+          <a:fontRef idx="minor">
+            <a:schemeClr val="tx1"/>
+          </a:fontRef>
+        </p:style>
+      </p:cxnSp>
+      <p:sp>
+        <p:nvSpPr>
+          <p:cNvPr id="6" name="楕円 5">
+            <a:extLst>
+              <a:ext uri="{FF2B5EF4-FFF2-40B4-BE49-F238E27FC236}">
+                <a16:creationId xmlns:a16="http://schemas.microsoft.com/office/drawing/2014/main" id="{77D87AF6-6053-0E5E-41FC-835957BA1897}"/>
+              </a:ext>
+            </a:extLst>
+          </p:cNvPr>
+          <p:cNvSpPr/>
+          <p:nvPr/>
+        </p:nvSpPr>
+        <p:spPr>
+          <a:xfrm>
+            <a:off x="2029983" y="1738766"/>
+            <a:ext cx="439971" cy="434763"/>
+          </a:xfrm>
+          <a:prstGeom prst="ellipse">
+            <a:avLst/>
+          </a:prstGeom>
+          <a:noFill/>
+          <a:ln>
+            <a:solidFill>
+              <a:schemeClr val="tx1"/>
+            </a:solidFill>
+          </a:ln>
+        </p:spPr>
+        <p:style>
+          <a:lnRef idx="2">
+            <a:schemeClr val="accent1">
+              <a:shade val="50000"/>
+            </a:schemeClr>
+          </a:lnRef>
+          <a:fillRef idx="1">
+            <a:schemeClr val="accent1"/>
+          </a:fillRef>
+          <a:effectRef idx="0">
+            <a:schemeClr val="accent1"/>
+          </a:effectRef>
+          <a:fontRef idx="minor">
+            <a:schemeClr val="lt1"/>
+          </a:fontRef>
+        </p:style>
+        <p:txBody>
+          <a:bodyPr rtlCol="0" anchor="ctr"/>
+          <a:lstStyle/>
+          <a:p>
+            <a:pPr algn="ctr"/>
+            <a:r>
+              <a:rPr lang="en-US" altLang="ja-JP" dirty="0">
+                <a:solidFill>
+                  <a:schemeClr val="tx1"/>
+                </a:solidFill>
+              </a:rPr>
+              <a:t>0</a:t>
+            </a:r>
+            <a:endParaRPr kumimoji="1" lang="ja-JP" altLang="en-US" dirty="0">
+              <a:solidFill>
+                <a:schemeClr val="tx1"/>
+              </a:solidFill>
+            </a:endParaRPr>
+          </a:p>
+        </p:txBody>
+      </p:sp>
+      <p:cxnSp>
+        <p:nvCxnSpPr>
+          <p:cNvPr id="8" name="直線コネクタ 7">
+            <a:extLst>
+              <a:ext uri="{FF2B5EF4-FFF2-40B4-BE49-F238E27FC236}">
+                <a16:creationId xmlns:a16="http://schemas.microsoft.com/office/drawing/2014/main" id="{580E5ABF-203F-5B48-A798-845CE32C6FD7}"/>
+              </a:ext>
+            </a:extLst>
+          </p:cNvPr>
+          <p:cNvCxnSpPr>
+            <a:cxnSpLocks/>
+            <a:stCxn id="51" idx="6"/>
+            <a:endCxn id="20" idx="2"/>
+          </p:cNvCxnSpPr>
+          <p:nvPr/>
+        </p:nvCxnSpPr>
+        <p:spPr>
+          <a:xfrm>
+            <a:off x="5475387" y="4470397"/>
+            <a:ext cx="527877" cy="2"/>
+          </a:xfrm>
+          <a:prstGeom prst="line">
+            <a:avLst/>
+          </a:prstGeom>
+          <a:ln>
+            <a:solidFill>
+              <a:schemeClr val="tx1"/>
+            </a:solidFill>
+          </a:ln>
+        </p:spPr>
+        <p:style>
+          <a:lnRef idx="1">
+            <a:schemeClr val="accent1"/>
+          </a:lnRef>
+          <a:fillRef idx="0">
+            <a:schemeClr val="accent1"/>
+          </a:fillRef>
+          <a:effectRef idx="0">
+            <a:schemeClr val="accent1"/>
+          </a:effectRef>
+          <a:fontRef idx="minor">
+            <a:schemeClr val="tx1"/>
+          </a:fontRef>
+        </p:style>
+      </p:cxnSp>
+      <p:sp>
+        <p:nvSpPr>
+          <p:cNvPr id="17" name="テキスト ボックス 16">
+            <a:extLst>
+              <a:ext uri="{FF2B5EF4-FFF2-40B4-BE49-F238E27FC236}">
+                <a16:creationId xmlns:a16="http://schemas.microsoft.com/office/drawing/2014/main" id="{77F8248F-EC1B-F5BD-3376-79D13122BF0D}"/>
+              </a:ext>
+            </a:extLst>
+          </p:cNvPr>
+          <p:cNvSpPr txBox="1"/>
+          <p:nvPr/>
+        </p:nvSpPr>
+        <p:spPr>
+          <a:xfrm>
+            <a:off x="1930400" y="766629"/>
+            <a:ext cx="8331200" cy="646331"/>
+          </a:xfrm>
+          <a:prstGeom prst="rect">
+            <a:avLst/>
+          </a:prstGeom>
+          <a:noFill/>
+        </p:spPr>
+        <p:txBody>
+          <a:bodyPr wrap="square" rtlCol="0">
+            <a:spAutoFit/>
+          </a:bodyPr>
+          <a:lstStyle/>
+          <a:p>
+            <a:r>
+              <a:rPr lang="en-US" altLang="ja-JP" b="0" i="0" dirty="0">
+                <a:solidFill>
+                  <a:srgbClr val="212121"/>
+                </a:solidFill>
+                <a:effectLst/>
+                <a:latin typeface="Courier New" panose="02070309020205020404" pitchFamily="49" charset="0"/>
+              </a:rPr>
+              <a:t>The probability that all labels are outputted along the most likely state transition: -20.665214012469935</a:t>
+            </a:r>
+            <a:r>
+              <a:rPr lang="ja-JP" altLang="en-US" b="0" i="0" dirty="0">
+                <a:solidFill>
+                  <a:srgbClr val="212121"/>
+                </a:solidFill>
+                <a:effectLst/>
+                <a:latin typeface="Courier New" panose="02070309020205020404" pitchFamily="49" charset="0"/>
+              </a:rPr>
+              <a:t>（対数表示）</a:t>
+            </a:r>
+            <a:endParaRPr kumimoji="1" lang="ja-JP" altLang="en-US" dirty="0"/>
+          </a:p>
+        </p:txBody>
+      </p:sp>
+      <p:pic>
+        <p:nvPicPr>
+          <p:cNvPr id="7" name="Picture 2">
+            <a:extLst>
+              <a:ext uri="{FF2B5EF4-FFF2-40B4-BE49-F238E27FC236}">
+                <a16:creationId xmlns:a16="http://schemas.microsoft.com/office/drawing/2014/main" id="{CA3F96F3-4825-9A04-35FF-4A2197DE1CBF}"/>
+              </a:ext>
+            </a:extLst>
+          </p:cNvPr>
+          <p:cNvPicPr>
+            <a:picLocks noChangeAspect="1" noChangeArrowheads="1"/>
+          </p:cNvPicPr>
+          <p:nvPr/>
+        </p:nvPicPr>
+        <p:blipFill>
+          <a:blip r:embed="rId2">
+            <a:extLst>
+              <a:ext uri="{28A0092B-C50C-407E-A947-70E740481C1C}">
+                <a14:useLocalDpi xmlns:a14="http://schemas.microsoft.com/office/drawing/2010/main" val="0"/>
+              </a:ext>
+            </a:extLst>
+          </a:blip>
+          <a:srcRect/>
+          <a:stretch>
+            <a:fillRect/>
+          </a:stretch>
+        </p:blipFill>
+        <p:spPr bwMode="auto">
+          <a:xfrm>
+            <a:off x="6971112" y="4253013"/>
+            <a:ext cx="4147083" cy="1840492"/>
+          </a:xfrm>
+          <a:prstGeom prst="rect">
+            <a:avLst/>
+          </a:prstGeom>
+          <a:noFill/>
+          <a:extLst>
+            <a:ext uri="{909E8E84-426E-40DD-AFC4-6F175D3DCCD1}">
+              <a14:hiddenFill xmlns:a14="http://schemas.microsoft.com/office/drawing/2010/main">
+                <a:solidFill>
+                  <a:srgbClr val="FFFFFF"/>
+                </a:solidFill>
+              </a14:hiddenFill>
+            </a:ext>
+          </a:extLst>
+        </p:spPr>
+      </p:pic>
+      <p:sp>
+        <p:nvSpPr>
+          <p:cNvPr id="9" name="テキスト ボックス 8">
+            <a:extLst>
+              <a:ext uri="{FF2B5EF4-FFF2-40B4-BE49-F238E27FC236}">
+                <a16:creationId xmlns:a16="http://schemas.microsoft.com/office/drawing/2014/main" id="{0DEF869F-3A57-BE9F-2C71-727D9F4AFD3C}"/>
+              </a:ext>
+            </a:extLst>
+          </p:cNvPr>
+          <p:cNvSpPr txBox="1"/>
+          <p:nvPr/>
+        </p:nvSpPr>
+        <p:spPr>
+          <a:xfrm>
+            <a:off x="8874825" y="5906705"/>
+            <a:ext cx="974889" cy="369332"/>
+          </a:xfrm>
+          <a:prstGeom prst="rect">
+            <a:avLst/>
+          </a:prstGeom>
+          <a:noFill/>
+        </p:spPr>
+        <p:txBody>
+          <a:bodyPr wrap="square">
+            <a:spAutoFit/>
+          </a:bodyPr>
+          <a:lstStyle/>
+          <a:p>
+            <a:pPr algn="l"/>
+            <a:r>
+              <a:rPr lang="en-US" altLang="ja-JP" b="1" i="0" dirty="0">
+                <a:solidFill>
+                  <a:srgbClr val="000000"/>
+                </a:solidFill>
+                <a:effectLst/>
+                <a:latin typeface="arial" panose="020B0604020202020204" pitchFamily="34" charset="0"/>
+              </a:rPr>
+              <a:t>SNFG</a:t>
+            </a:r>
+          </a:p>
+        </p:txBody>
+      </p:sp>
+    </p:spTree>
+    <p:extLst>
+      <p:ext uri="{BB962C8B-B14F-4D97-AF65-F5344CB8AC3E}">
+        <p14:creationId xmlns:p14="http://schemas.microsoft.com/office/powerpoint/2010/main" val="1488004092"/>
+      </p:ext>
+    </p:extLst>
+  </p:cSld>
+  <p:clrMapOvr>
+    <a:masterClrMapping/>
+  </p:clrMapOvr>
+</p:sld>
+</file>
+
+<file path=ppt/slides/slide4.xml><?xml version="1.0" encoding="utf-8"?>
+<p:sld xmlns:a="http://schemas.openxmlformats.org/drawingml/2006/main" xmlns:r="http://schemas.openxmlformats.org/officeDocument/2006/relationships" xmlns:p="http://schemas.openxmlformats.org/presentationml/2006/main">
+  <p:cSld>
+    <p:spTree>
+      <p:nvGrpSpPr>
+        <p:cNvPr id="1" name=""/>
+        <p:cNvGrpSpPr/>
+        <p:nvPr/>
+      </p:nvGrpSpPr>
+      <p:grpSpPr>
+        <a:xfrm>
+          <a:off x="0" y="0"/>
+          <a:ext cx="0" cy="0"/>
+          <a:chOff x="0" y="0"/>
+          <a:chExt cx="0" cy="0"/>
+        </a:xfrm>
+      </p:grpSpPr>
+      <p:sp>
+        <p:nvSpPr>
+          <p:cNvPr id="2" name="楕円 1">
+            <a:extLst>
+              <a:ext uri="{FF2B5EF4-FFF2-40B4-BE49-F238E27FC236}">
+                <a16:creationId xmlns:a16="http://schemas.microsoft.com/office/drawing/2014/main" id="{99E2A3C1-8E54-23CE-CFCA-6E9E50E0826B}"/>
+              </a:ext>
+            </a:extLst>
+          </p:cNvPr>
+          <p:cNvSpPr/>
+          <p:nvPr/>
+        </p:nvSpPr>
+        <p:spPr>
+          <a:xfrm>
+            <a:off x="8922299" y="3211618"/>
+            <a:ext cx="439971" cy="434763"/>
+          </a:xfrm>
+          <a:prstGeom prst="ellipse">
+            <a:avLst/>
+          </a:prstGeom>
+          <a:noFill/>
+          <a:ln>
+            <a:solidFill>
+              <a:schemeClr val="tx1"/>
+            </a:solidFill>
+          </a:ln>
+        </p:spPr>
+        <p:style>
+          <a:lnRef idx="2">
+            <a:schemeClr val="accent1">
+              <a:shade val="50000"/>
+            </a:schemeClr>
+          </a:lnRef>
+          <a:fillRef idx="1">
+            <a:schemeClr val="accent1"/>
+          </a:fillRef>
+          <a:effectRef idx="0">
+            <a:schemeClr val="accent1"/>
+          </a:effectRef>
+          <a:fontRef idx="minor">
+            <a:schemeClr val="lt1"/>
+          </a:fontRef>
+        </p:style>
+        <p:txBody>
+          <a:bodyPr rtlCol="0" anchor="ctr"/>
+          <a:lstStyle/>
+          <a:p>
+            <a:pPr algn="ctr"/>
+            <a:r>
+              <a:rPr lang="en-US" altLang="ja-JP" dirty="0">
+                <a:solidFill>
+                  <a:schemeClr val="tx1"/>
+                </a:solidFill>
+              </a:rPr>
+              <a:t>4</a:t>
+            </a:r>
+            <a:endParaRPr kumimoji="1" lang="ja-JP" altLang="en-US" dirty="0">
+              <a:solidFill>
+                <a:schemeClr val="tx1"/>
+              </a:solidFill>
+            </a:endParaRPr>
+          </a:p>
+        </p:txBody>
+      </p:sp>
+      <p:cxnSp>
+        <p:nvCxnSpPr>
+          <p:cNvPr id="4" name="直線コネクタ 3">
+            <a:extLst>
+              <a:ext uri="{FF2B5EF4-FFF2-40B4-BE49-F238E27FC236}">
+                <a16:creationId xmlns:a16="http://schemas.microsoft.com/office/drawing/2014/main" id="{6F147F4B-8FAC-056D-BC9B-BF5397D939A4}"/>
+              </a:ext>
+            </a:extLst>
+          </p:cNvPr>
+          <p:cNvCxnSpPr>
+            <a:cxnSpLocks/>
+            <a:stCxn id="5" idx="6"/>
+            <a:endCxn id="2" idx="2"/>
+          </p:cNvCxnSpPr>
+          <p:nvPr/>
+        </p:nvCxnSpPr>
+        <p:spPr>
+          <a:xfrm>
+            <a:off x="8389259" y="3429000"/>
+            <a:ext cx="533040" cy="0"/>
+          </a:xfrm>
+          <a:prstGeom prst="line">
+            <a:avLst/>
+          </a:prstGeom>
+          <a:ln>
+            <a:solidFill>
+              <a:schemeClr val="tx1"/>
+            </a:solidFill>
+          </a:ln>
+        </p:spPr>
+        <p:style>
+          <a:lnRef idx="1">
+            <a:schemeClr val="accent1"/>
+          </a:lnRef>
+          <a:fillRef idx="0">
+            <a:schemeClr val="accent1"/>
+          </a:fillRef>
+          <a:effectRef idx="0">
+            <a:schemeClr val="accent1"/>
+          </a:effectRef>
+          <a:fontRef idx="minor">
+            <a:schemeClr val="tx1"/>
+          </a:fontRef>
+        </p:style>
+      </p:cxnSp>
+      <p:sp>
+        <p:nvSpPr>
+          <p:cNvPr id="5" name="楕円 4">
+            <a:extLst>
+              <a:ext uri="{FF2B5EF4-FFF2-40B4-BE49-F238E27FC236}">
+                <a16:creationId xmlns:a16="http://schemas.microsoft.com/office/drawing/2014/main" id="{2D4BC0B0-567F-CC57-EEC8-2C8E2A8B137D}"/>
+              </a:ext>
+            </a:extLst>
+          </p:cNvPr>
+          <p:cNvSpPr/>
+          <p:nvPr/>
+        </p:nvSpPr>
+        <p:spPr>
+          <a:xfrm>
+            <a:off x="7949288" y="3211618"/>
+            <a:ext cx="439971" cy="434763"/>
+          </a:xfrm>
+          <a:prstGeom prst="ellipse">
+            <a:avLst/>
+          </a:prstGeom>
+          <a:noFill/>
+          <a:ln>
+            <a:solidFill>
+              <a:schemeClr val="tx1"/>
+            </a:solidFill>
+          </a:ln>
+        </p:spPr>
+        <p:style>
+          <a:lnRef idx="2">
+            <a:schemeClr val="accent1">
+              <a:shade val="50000"/>
+            </a:schemeClr>
+          </a:lnRef>
+          <a:fillRef idx="1">
+            <a:schemeClr val="accent1"/>
+          </a:fillRef>
+          <a:effectRef idx="0">
+            <a:schemeClr val="accent1"/>
+          </a:effectRef>
+          <a:fontRef idx="minor">
+            <a:schemeClr val="lt1"/>
+          </a:fontRef>
+        </p:style>
+        <p:txBody>
+          <a:bodyPr rtlCol="0" anchor="ctr"/>
+          <a:lstStyle/>
+          <a:p>
+            <a:pPr algn="ctr"/>
+            <a:r>
+              <a:rPr lang="en-US" altLang="ja-JP" dirty="0">
+                <a:solidFill>
+                  <a:schemeClr val="tx1"/>
+                </a:solidFill>
+              </a:rPr>
+              <a:t>1</a:t>
+            </a:r>
+            <a:endParaRPr kumimoji="1" lang="ja-JP" altLang="en-US" dirty="0">
+              <a:solidFill>
+                <a:schemeClr val="tx1"/>
+              </a:solidFill>
+            </a:endParaRPr>
+          </a:p>
+        </p:txBody>
+      </p:sp>
+      <p:sp>
+        <p:nvSpPr>
+          <p:cNvPr id="15" name="楕円 14">
+            <a:extLst>
+              <a:ext uri="{FF2B5EF4-FFF2-40B4-BE49-F238E27FC236}">
+                <a16:creationId xmlns:a16="http://schemas.microsoft.com/office/drawing/2014/main" id="{A36C3C59-ABD2-F701-50FD-3A47E6659924}"/>
+              </a:ext>
+            </a:extLst>
+          </p:cNvPr>
+          <p:cNvSpPr/>
+          <p:nvPr/>
+        </p:nvSpPr>
+        <p:spPr>
+          <a:xfrm>
+            <a:off x="6976277" y="3211617"/>
+            <a:ext cx="439971" cy="434763"/>
+          </a:xfrm>
+          <a:prstGeom prst="ellipse">
+            <a:avLst/>
+          </a:prstGeom>
+          <a:noFill/>
+          <a:ln>
+            <a:solidFill>
+              <a:schemeClr val="tx1"/>
+            </a:solidFill>
+          </a:ln>
+        </p:spPr>
+        <p:style>
+          <a:lnRef idx="2">
+            <a:schemeClr val="accent1">
+              <a:shade val="50000"/>
+            </a:schemeClr>
+          </a:lnRef>
+          <a:fillRef idx="1">
+            <a:schemeClr val="accent1"/>
+          </a:fillRef>
+          <a:effectRef idx="0">
+            <a:schemeClr val="accent1"/>
+          </a:effectRef>
+          <a:fontRef idx="minor">
+            <a:schemeClr val="lt1"/>
+          </a:fontRef>
+        </p:style>
+        <p:txBody>
+          <a:bodyPr rtlCol="0" anchor="ctr"/>
+          <a:lstStyle/>
+          <a:p>
+            <a:pPr algn="ctr"/>
+            <a:r>
               <a:rPr kumimoji="1" lang="en-US" altLang="ja-JP" dirty="0">
                 <a:solidFill>
                   <a:schemeClr val="tx1"/>
@@ -9605,7 +11770,7 @@
 </p:sld>
 </file>
 
-<file path=ppt/slides/slide4.xml><?xml version="1.0" encoding="utf-8"?>
+<file path=ppt/slides/slide5.xml><?xml version="1.0" encoding="utf-8"?>
 <p:sld xmlns:a="http://schemas.openxmlformats.org/drawingml/2006/main" xmlns:r="http://schemas.openxmlformats.org/officeDocument/2006/relationships" xmlns:p="http://schemas.openxmlformats.org/presentationml/2006/main">
   <p:cSld>
     <p:spTree>

</xml_diff>